<commit_message>
updating slides and fixing some inexplicable structure code :P
</commit_message>
<xml_diff>
--- a/Final Presentation.pptx
+++ b/Final Presentation.pptx
@@ -10,11 +10,13 @@
     <p:sldId id="258" r:id="rId4"/>
     <p:sldId id="262" r:id="rId5"/>
     <p:sldId id="263" r:id="rId6"/>
-    <p:sldId id="259" r:id="rId7"/>
-    <p:sldId id="260" r:id="rId8"/>
-    <p:sldId id="261" r:id="rId9"/>
-    <p:sldId id="264" r:id="rId10"/>
-    <p:sldId id="265" r:id="rId11"/>
+    <p:sldId id="266" r:id="rId7"/>
+    <p:sldId id="259" r:id="rId8"/>
+    <p:sldId id="260" r:id="rId9"/>
+    <p:sldId id="267" r:id="rId10"/>
+    <p:sldId id="261" r:id="rId11"/>
+    <p:sldId id="264" r:id="rId12"/>
+    <p:sldId id="265" r:id="rId13"/>
   </p:sldIdLst>
   <p:sldSz cx="12192000" cy="6858000"/>
   <p:notesSz cx="6858000" cy="9144000"/>
@@ -113,6 +115,11 @@
       </a:defRPr>
     </a:lvl9pPr>
   </p:defaultTextStyle>
+  <p:extLst>
+    <p:ext uri="{EFAFB233-063F-42B5-8137-9DF3F51BA10A}">
+      <p15:sldGuideLst xmlns:p15="http://schemas.microsoft.com/office/powerpoint/2012/main"/>
+    </p:ext>
+  </p:extLst>
 </p:presentation>
 </file>
 
@@ -618,7 +625,7 @@
           <a:p>
             <a:fld id="{E2F10705-3ACF-49C3-8EB3-8D79EFEFEC72}" type="datetimeFigureOut">
               <a:rPr lang="en-US" smtClean="0"/>
-              <a:t>3/1/2018</a:t>
+              <a:t>3/3/2018</a:t>
             </a:fld>
             <a:endParaRPr lang="en-US"/>
           </a:p>
@@ -914,7 +921,7 @@
           <a:p>
             <a:fld id="{E2F10705-3ACF-49C3-8EB3-8D79EFEFEC72}" type="datetimeFigureOut">
               <a:rPr lang="en-US" smtClean="0"/>
-              <a:t>3/1/2018</a:t>
+              <a:t>3/3/2018</a:t>
             </a:fld>
             <a:endParaRPr lang="en-US"/>
           </a:p>
@@ -1162,7 +1169,7 @@
           <a:p>
             <a:fld id="{E2F10705-3ACF-49C3-8EB3-8D79EFEFEC72}" type="datetimeFigureOut">
               <a:rPr lang="en-US" smtClean="0"/>
-              <a:t>3/1/2018</a:t>
+              <a:t>3/3/2018</a:t>
             </a:fld>
             <a:endParaRPr lang="en-US"/>
           </a:p>
@@ -1702,7 +1709,7 @@
           <a:p>
             <a:fld id="{E2F10705-3ACF-49C3-8EB3-8D79EFEFEC72}" type="datetimeFigureOut">
               <a:rPr lang="en-US" smtClean="0"/>
-              <a:t>3/1/2018</a:t>
+              <a:t>3/3/2018</a:t>
             </a:fld>
             <a:endParaRPr lang="en-US"/>
           </a:p>
@@ -1950,7 +1957,7 @@
           <a:p>
             <a:fld id="{E2F10705-3ACF-49C3-8EB3-8D79EFEFEC72}" type="datetimeFigureOut">
               <a:rPr lang="en-US" smtClean="0"/>
-              <a:t>3/1/2018</a:t>
+              <a:t>3/3/2018</a:t>
             </a:fld>
             <a:endParaRPr lang="en-US"/>
           </a:p>
@@ -2482,7 +2489,7 @@
           <a:p>
             <a:fld id="{E2F10705-3ACF-49C3-8EB3-8D79EFEFEC72}" type="datetimeFigureOut">
               <a:rPr lang="en-US" smtClean="0"/>
-              <a:t>3/1/2018</a:t>
+              <a:t>3/3/2018</a:t>
             </a:fld>
             <a:endParaRPr lang="en-US"/>
           </a:p>
@@ -2779,7 +2786,7 @@
           <a:p>
             <a:fld id="{E2F10705-3ACF-49C3-8EB3-8D79EFEFEC72}" type="datetimeFigureOut">
               <a:rPr lang="en-US" smtClean="0"/>
-              <a:t>3/1/2018</a:t>
+              <a:t>3/3/2018</a:t>
             </a:fld>
             <a:endParaRPr lang="en-US"/>
           </a:p>
@@ -2953,7 +2960,7 @@
           <a:p>
             <a:fld id="{E2F10705-3ACF-49C3-8EB3-8D79EFEFEC72}" type="datetimeFigureOut">
               <a:rPr lang="en-US" smtClean="0"/>
-              <a:t>3/1/2018</a:t>
+              <a:t>3/3/2018</a:t>
             </a:fld>
             <a:endParaRPr lang="en-US"/>
           </a:p>
@@ -3133,7 +3140,7 @@
           <a:p>
             <a:fld id="{E2F10705-3ACF-49C3-8EB3-8D79EFEFEC72}" type="datetimeFigureOut">
               <a:rPr lang="en-US" smtClean="0"/>
-              <a:t>3/1/2018</a:t>
+              <a:t>3/3/2018</a:t>
             </a:fld>
             <a:endParaRPr lang="en-US"/>
           </a:p>
@@ -3303,7 +3310,7 @@
           <a:p>
             <a:fld id="{E2F10705-3ACF-49C3-8EB3-8D79EFEFEC72}" type="datetimeFigureOut">
               <a:rPr lang="en-US" smtClean="0"/>
-              <a:t>3/1/2018</a:t>
+              <a:t>3/3/2018</a:t>
             </a:fld>
             <a:endParaRPr lang="en-US"/>
           </a:p>
@@ -3554,7 +3561,7 @@
           <a:p>
             <a:fld id="{E2F10705-3ACF-49C3-8EB3-8D79EFEFEC72}" type="datetimeFigureOut">
               <a:rPr lang="en-US" smtClean="0"/>
-              <a:t>3/1/2018</a:t>
+              <a:t>3/3/2018</a:t>
             </a:fld>
             <a:endParaRPr lang="en-US"/>
           </a:p>
@@ -3851,7 +3858,7 @@
           <a:p>
             <a:fld id="{E2F10705-3ACF-49C3-8EB3-8D79EFEFEC72}" type="datetimeFigureOut">
               <a:rPr lang="en-US" smtClean="0"/>
-              <a:t>3/1/2018</a:t>
+              <a:t>3/3/2018</a:t>
             </a:fld>
             <a:endParaRPr lang="en-US"/>
           </a:p>
@@ -4293,7 +4300,7 @@
           <a:p>
             <a:fld id="{E2F10705-3ACF-49C3-8EB3-8D79EFEFEC72}" type="datetimeFigureOut">
               <a:rPr lang="en-US" smtClean="0"/>
-              <a:t>3/1/2018</a:t>
+              <a:t>3/3/2018</a:t>
             </a:fld>
             <a:endParaRPr lang="en-US"/>
           </a:p>
@@ -4411,7 +4418,7 @@
           <a:p>
             <a:fld id="{E2F10705-3ACF-49C3-8EB3-8D79EFEFEC72}" type="datetimeFigureOut">
               <a:rPr lang="en-US" smtClean="0"/>
-              <a:t>3/1/2018</a:t>
+              <a:t>3/3/2018</a:t>
             </a:fld>
             <a:endParaRPr lang="en-US"/>
           </a:p>
@@ -4506,7 +4513,7 @@
           <a:p>
             <a:fld id="{E2F10705-3ACF-49C3-8EB3-8D79EFEFEC72}" type="datetimeFigureOut">
               <a:rPr lang="en-US" smtClean="0"/>
-              <a:t>3/1/2018</a:t>
+              <a:t>3/3/2018</a:t>
             </a:fld>
             <a:endParaRPr lang="en-US"/>
           </a:p>
@@ -4789,7 +4796,7 @@
           <a:p>
             <a:fld id="{E2F10705-3ACF-49C3-8EB3-8D79EFEFEC72}" type="datetimeFigureOut">
               <a:rPr lang="en-US" smtClean="0"/>
-              <a:t>3/1/2018</a:t>
+              <a:t>3/3/2018</a:t>
             </a:fld>
             <a:endParaRPr lang="en-US"/>
           </a:p>
@@ -5080,7 +5087,7 @@
           <a:p>
             <a:fld id="{E2F10705-3ACF-49C3-8EB3-8D79EFEFEC72}" type="datetimeFigureOut">
               <a:rPr lang="en-US" smtClean="0"/>
-              <a:t>3/1/2018</a:t>
+              <a:t>3/3/2018</a:t>
             </a:fld>
             <a:endParaRPr lang="en-US"/>
           </a:p>
@@ -5610,7 +5617,7 @@
           <a:p>
             <a:fld id="{E2F10705-3ACF-49C3-8EB3-8D79EFEFEC72}" type="datetimeFigureOut">
               <a:rPr lang="en-US" smtClean="0"/>
-              <a:t>3/1/2018</a:t>
+              <a:t>3/3/2018</a:t>
             </a:fld>
             <a:endParaRPr lang="en-US"/>
           </a:p>
@@ -6271,12 +6278,12 @@
       </p:grpSpPr>
       <p:sp>
         <p:nvSpPr>
-          <p:cNvPr id="4" name="Title 3"/>
-          <p:cNvSpPr>
-            <a:spLocks noGrp="1"/>
-          </p:cNvSpPr>
-          <p:nvPr>
-            <p:ph type="ctrTitle"/>
+          <p:cNvPr id="2" name="Title 1"/>
+          <p:cNvSpPr>
+            <a:spLocks noGrp="1"/>
+          </p:cNvSpPr>
+          <p:nvPr>
+            <p:ph type="title"/>
           </p:nvPr>
         </p:nvSpPr>
         <p:spPr/>
@@ -6286,1052 +6293,26 @@
           <a:p>
             <a:r>
               <a:rPr lang="en-US" b="1" dirty="0" smtClean="0"/>
-              <a:t>Thank you. </a:t>
-            </a:r>
-            <a:br>
-              <a:rPr lang="en-US" b="1" dirty="0" smtClean="0"/>
-            </a:br>
-            <a:r>
-              <a:rPr lang="en-US" dirty="0" smtClean="0"/>
-              <a:t>Questions?</a:t>
-            </a:r>
-            <a:endParaRPr lang="en-US" dirty="0"/>
-          </a:p>
-        </p:txBody>
-      </p:sp>
-    </p:spTree>
-    <p:extLst>
-      <p:ext uri="{BB962C8B-B14F-4D97-AF65-F5344CB8AC3E}">
-        <p14:creationId xmlns:p14="http://schemas.microsoft.com/office/powerpoint/2010/main" val="2282552027"/>
-      </p:ext>
-    </p:extLst>
-  </p:cSld>
-  <p:clrMapOvr>
-    <a:masterClrMapping/>
-  </p:clrMapOvr>
-</p:sld>
-</file>
-
-<file path=ppt/slides/slide2.xml><?xml version="1.0" encoding="utf-8"?>
-<p:sld xmlns:a="http://schemas.openxmlformats.org/drawingml/2006/main" xmlns:r="http://schemas.openxmlformats.org/officeDocument/2006/relationships" xmlns:p="http://schemas.openxmlformats.org/presentationml/2006/main">
-  <p:cSld>
-    <p:spTree>
-      <p:nvGrpSpPr>
-        <p:cNvPr id="1" name=""/>
-        <p:cNvGrpSpPr/>
-        <p:nvPr/>
-      </p:nvGrpSpPr>
-      <p:grpSpPr>
-        <a:xfrm>
-          <a:off x="0" y="0"/>
-          <a:ext cx="0" cy="0"/>
-          <a:chOff x="0" y="0"/>
-          <a:chExt cx="0" cy="0"/>
-        </a:xfrm>
-      </p:grpSpPr>
-      <p:sp>
-        <p:nvSpPr>
-          <p:cNvPr id="2" name="Title 1"/>
-          <p:cNvSpPr>
-            <a:spLocks noGrp="1"/>
-          </p:cNvSpPr>
-          <p:nvPr>
-            <p:ph type="title"/>
+              <a:t>Result to Rendering</a:t>
+            </a:r>
+            <a:endParaRPr lang="en-US" b="1" dirty="0"/>
+          </a:p>
+        </p:txBody>
+      </p:sp>
+      <p:sp>
+        <p:nvSpPr>
+          <p:cNvPr id="3" name="Content Placeholder 2"/>
+          <p:cNvSpPr>
+            <a:spLocks noGrp="1"/>
+          </p:cNvSpPr>
+          <p:nvPr>
+            <p:ph idx="1"/>
           </p:nvPr>
         </p:nvSpPr>
         <p:spPr/>
         <p:txBody>
-          <a:bodyPr/>
-          <a:lstStyle/>
-          <a:p>
-            <a:r>
-              <a:rPr lang="en-US" b="1" dirty="0" smtClean="0"/>
-              <a:t>Modeling</a:t>
-            </a:r>
-            <a:endParaRPr lang="en-US" b="1" dirty="0"/>
-          </a:p>
-        </p:txBody>
-      </p:sp>
-      <p:sp>
-        <p:nvSpPr>
-          <p:cNvPr id="3" name="Content Placeholder 2"/>
-          <p:cNvSpPr>
-            <a:spLocks noGrp="1"/>
-          </p:cNvSpPr>
-          <p:nvPr>
-            <p:ph idx="1"/>
-          </p:nvPr>
-        </p:nvSpPr>
-        <p:spPr>
-          <a:xfrm>
-            <a:off x="1484310" y="2253803"/>
-            <a:ext cx="10018713" cy="3537397"/>
-          </a:xfrm>
-        </p:spPr>
-        <p:txBody>
           <a:bodyPr>
-            <a:normAutofit/>
-          </a:bodyPr>
-          <a:lstStyle/>
-          <a:p>
-            <a:r>
-              <a:rPr lang="en-US" dirty="0" smtClean="0">
-                <a:latin typeface="Arial" panose="020B0604020202020204" pitchFamily="34" charset="0"/>
-                <a:cs typeface="Arial" panose="020B0604020202020204" pitchFamily="34" charset="0"/>
-              </a:rPr>
-              <a:t>Define </a:t>
-            </a:r>
-            <a:r>
-              <a:rPr lang="en-US" dirty="0">
-                <a:latin typeface="Arial" panose="020B0604020202020204" pitchFamily="34" charset="0"/>
-                <a:cs typeface="Arial" panose="020B0604020202020204" pitchFamily="34" charset="0"/>
-              </a:rPr>
-              <a:t>a procedural grammar suitable for describing a room (including windows, doors, ...).</a:t>
-            </a:r>
-          </a:p>
-          <a:p>
-            <a:r>
-              <a:rPr lang="en-US" dirty="0">
-                <a:latin typeface="Arial" panose="020B0604020202020204" pitchFamily="34" charset="0"/>
-                <a:cs typeface="Arial" panose="020B0604020202020204" pitchFamily="34" charset="0"/>
-              </a:rPr>
-              <a:t>Parse a grammar file of such a procedural description</a:t>
-            </a:r>
-            <a:r>
-              <a:rPr lang="en-US" dirty="0" smtClean="0">
-                <a:latin typeface="Arial" panose="020B0604020202020204" pitchFamily="34" charset="0"/>
-                <a:cs typeface="Arial" panose="020B0604020202020204" pitchFamily="34" charset="0"/>
-              </a:rPr>
-              <a:t>.</a:t>
-            </a:r>
-          </a:p>
-          <a:p>
-            <a:r>
-              <a:rPr lang="en-US" dirty="0" smtClean="0">
-                <a:latin typeface="Arial" panose="020B0604020202020204" pitchFamily="34" charset="0"/>
-                <a:cs typeface="Arial" panose="020B0604020202020204" pitchFamily="34" charset="0"/>
-              </a:rPr>
-              <a:t>Define </a:t>
-            </a:r>
-            <a:r>
-              <a:rPr lang="en-US" dirty="0">
-                <a:latin typeface="Arial" panose="020B0604020202020204" pitchFamily="34" charset="0"/>
-                <a:cs typeface="Arial" panose="020B0604020202020204" pitchFamily="34" charset="0"/>
-              </a:rPr>
-              <a:t>the data structure for grammar and geometry (tree structure).</a:t>
-            </a:r>
-          </a:p>
-          <a:p>
-            <a:r>
-              <a:rPr lang="en-US" dirty="0" smtClean="0">
-                <a:latin typeface="Arial" panose="020B0604020202020204" pitchFamily="34" charset="0"/>
-                <a:cs typeface="Arial" panose="020B0604020202020204" pitchFamily="34" charset="0"/>
-              </a:rPr>
-              <a:t>Apply </a:t>
-            </a:r>
-            <a:r>
-              <a:rPr lang="en-US" dirty="0">
-                <a:latin typeface="Arial" panose="020B0604020202020204" pitchFamily="34" charset="0"/>
-                <a:cs typeface="Arial" panose="020B0604020202020204" pitchFamily="34" charset="0"/>
-              </a:rPr>
-              <a:t>procedural rules, generate room geometry and store it into the data structure.</a:t>
-            </a:r>
-          </a:p>
-          <a:p>
-            <a:r>
-              <a:rPr lang="en-US" dirty="0">
-                <a:latin typeface="Arial" panose="020B0604020202020204" pitchFamily="34" charset="0"/>
-                <a:cs typeface="Arial" panose="020B0604020202020204" pitchFamily="34" charset="0"/>
-              </a:rPr>
-              <a:t>Pass the intermediate result to renderer</a:t>
-            </a:r>
-            <a:r>
-              <a:rPr lang="en-US" dirty="0" smtClean="0">
-                <a:latin typeface="Arial" panose="020B0604020202020204" pitchFamily="34" charset="0"/>
-                <a:cs typeface="Arial" panose="020B0604020202020204" pitchFamily="34" charset="0"/>
-              </a:rPr>
-              <a:t>.</a:t>
-            </a:r>
-            <a:endParaRPr lang="en-US" dirty="0">
-              <a:latin typeface="Arial" panose="020B0604020202020204" pitchFamily="34" charset="0"/>
-              <a:cs typeface="Arial" panose="020B0604020202020204" pitchFamily="34" charset="0"/>
-            </a:endParaRPr>
-          </a:p>
-        </p:txBody>
-      </p:sp>
-    </p:spTree>
-    <p:extLst>
-      <p:ext uri="{BB962C8B-B14F-4D97-AF65-F5344CB8AC3E}">
-        <p14:creationId xmlns:p14="http://schemas.microsoft.com/office/powerpoint/2010/main" val="1629815597"/>
-      </p:ext>
-    </p:extLst>
-  </p:cSld>
-  <p:clrMapOvr>
-    <a:masterClrMapping/>
-  </p:clrMapOvr>
-  <p:timing>
-    <p:tnLst>
-      <p:par>
-        <p:cTn id="1" dur="indefinite" restart="never" nodeType="tmRoot"/>
-      </p:par>
-    </p:tnLst>
-  </p:timing>
-</p:sld>
-</file>
-
-<file path=ppt/slides/slide3.xml><?xml version="1.0" encoding="utf-8"?>
-<p:sld xmlns:a="http://schemas.openxmlformats.org/drawingml/2006/main" xmlns:r="http://schemas.openxmlformats.org/officeDocument/2006/relationships" xmlns:p="http://schemas.openxmlformats.org/presentationml/2006/main">
-  <p:cSld>
-    <p:spTree>
-      <p:nvGrpSpPr>
-        <p:cNvPr id="1" name=""/>
-        <p:cNvGrpSpPr/>
-        <p:nvPr/>
-      </p:nvGrpSpPr>
-      <p:grpSpPr>
-        <a:xfrm>
-          <a:off x="0" y="0"/>
-          <a:ext cx="0" cy="0"/>
-          <a:chOff x="0" y="0"/>
-          <a:chExt cx="0" cy="0"/>
-        </a:xfrm>
-      </p:grpSpPr>
-      <p:sp>
-        <p:nvSpPr>
-          <p:cNvPr id="2" name="Title 1"/>
-          <p:cNvSpPr>
-            <a:spLocks noGrp="1"/>
-          </p:cNvSpPr>
-          <p:nvPr>
-            <p:ph type="title"/>
-          </p:nvPr>
-        </p:nvSpPr>
-        <p:spPr/>
-        <p:txBody>
-          <a:bodyPr/>
-          <a:lstStyle/>
-          <a:p>
-            <a:r>
-              <a:rPr lang="en-US" b="1" dirty="0"/>
-              <a:t>P</a:t>
-            </a:r>
-            <a:r>
-              <a:rPr lang="en-US" b="1" dirty="0" smtClean="0"/>
-              <a:t>rocedural Grammar for Describing </a:t>
-            </a:r>
-            <a:r>
-              <a:rPr lang="en-US" b="1" dirty="0"/>
-              <a:t>a </a:t>
-            </a:r>
-            <a:r>
-              <a:rPr lang="en-US" b="1" dirty="0" smtClean="0"/>
-              <a:t>Room</a:t>
-            </a:r>
-            <a:endParaRPr lang="en-US" b="1" dirty="0"/>
-          </a:p>
-        </p:txBody>
-      </p:sp>
-      <p:sp>
-        <p:nvSpPr>
-          <p:cNvPr id="3" name="Content Placeholder 2"/>
-          <p:cNvSpPr>
-            <a:spLocks noGrp="1"/>
-          </p:cNvSpPr>
-          <p:nvPr>
-            <p:ph idx="1"/>
-          </p:nvPr>
-        </p:nvSpPr>
-        <p:spPr>
-          <a:xfrm>
-            <a:off x="1484310" y="2666999"/>
-            <a:ext cx="10018713" cy="3437587"/>
-          </a:xfrm>
-        </p:spPr>
-        <p:txBody>
-          <a:bodyPr>
-            <a:normAutofit lnSpcReduction="10000"/>
-          </a:bodyPr>
-          <a:lstStyle/>
-          <a:p>
-            <a:r>
-              <a:rPr lang="en-US" dirty="0" smtClean="0">
-                <a:latin typeface="Arial" panose="020B0604020202020204" pitchFamily="34" charset="0"/>
-                <a:cs typeface="Arial" panose="020B0604020202020204" pitchFamily="34" charset="0"/>
-              </a:rPr>
-              <a:t>Definition of a rule:</a:t>
-            </a:r>
-          </a:p>
-          <a:p>
-            <a:pPr marL="0" indent="0">
-              <a:buNone/>
-            </a:pPr>
-            <a:r>
-              <a:rPr lang="en-US" dirty="0" smtClean="0">
-                <a:latin typeface="Arial" panose="020B0604020202020204" pitchFamily="34" charset="0"/>
-                <a:cs typeface="Arial" panose="020B0604020202020204" pitchFamily="34" charset="0"/>
-              </a:rPr>
-              <a:t>Head</a:t>
-            </a:r>
-            <a:r>
-              <a:rPr lang="en-US" b="1" dirty="0" smtClean="0">
-                <a:latin typeface="Arial" panose="020B0604020202020204" pitchFamily="34" charset="0"/>
-                <a:cs typeface="Arial" panose="020B0604020202020204" pitchFamily="34" charset="0"/>
-              </a:rPr>
-              <a:t>=</a:t>
-            </a:r>
-            <a:r>
-              <a:rPr lang="en-US" dirty="0" smtClean="0">
-                <a:latin typeface="Arial" panose="020B0604020202020204" pitchFamily="34" charset="0"/>
-                <a:cs typeface="Arial" panose="020B0604020202020204" pitchFamily="34" charset="0"/>
-              </a:rPr>
-              <a:t>Rules </a:t>
-            </a:r>
-            <a:r>
-              <a:rPr lang="en-US" dirty="0" err="1" smtClean="0">
-                <a:latin typeface="Arial" panose="020B0604020202020204" pitchFamily="34" charset="0"/>
-                <a:cs typeface="Arial" panose="020B0604020202020204" pitchFamily="34" charset="0"/>
-              </a:rPr>
-              <a:t>operators</a:t>
-            </a:r>
-            <a:r>
-              <a:rPr lang="en-US" b="1" dirty="0" err="1" smtClean="0">
-                <a:latin typeface="Arial" panose="020B0604020202020204" pitchFamily="34" charset="0"/>
-                <a:cs typeface="Arial" panose="020B0604020202020204" pitchFamily="34" charset="0"/>
-              </a:rPr>
-              <a:t>:</a:t>
-            </a:r>
-            <a:r>
-              <a:rPr lang="en-US" dirty="0" err="1" smtClean="0">
-                <a:latin typeface="Arial" panose="020B0604020202020204" pitchFamily="34" charset="0"/>
-                <a:cs typeface="Arial" panose="020B0604020202020204" pitchFamily="34" charset="0"/>
-              </a:rPr>
-              <a:t>Probability</a:t>
-            </a:r>
-            <a:endParaRPr lang="en-US" dirty="0" smtClean="0">
-              <a:latin typeface="Arial" panose="020B0604020202020204" pitchFamily="34" charset="0"/>
-              <a:cs typeface="Arial" panose="020B0604020202020204" pitchFamily="34" charset="0"/>
-            </a:endParaRPr>
-          </a:p>
-          <a:p>
-            <a:r>
-              <a:rPr lang="en-US" dirty="0" smtClean="0">
-                <a:latin typeface="Arial" panose="020B0604020202020204" pitchFamily="34" charset="0"/>
-                <a:cs typeface="Arial" panose="020B0604020202020204" pitchFamily="34" charset="0"/>
-              </a:rPr>
-              <a:t>Example:</a:t>
-            </a:r>
-          </a:p>
-          <a:p>
-            <a:pPr marL="0" indent="0">
-              <a:buNone/>
-            </a:pPr>
-            <a:r>
-              <a:rPr lang="en-US" dirty="0" smtClean="0">
-                <a:latin typeface="Arial" panose="020B0604020202020204" pitchFamily="34" charset="0"/>
-                <a:cs typeface="Arial" panose="020B0604020202020204" pitchFamily="34" charset="0"/>
-              </a:rPr>
-              <a:t>main=S(20,20,20</a:t>
-            </a:r>
-            <a:r>
-              <a:rPr lang="en-US" dirty="0">
-                <a:latin typeface="Arial" panose="020B0604020202020204" pitchFamily="34" charset="0"/>
-                <a:cs typeface="Arial" panose="020B0604020202020204" pitchFamily="34" charset="0"/>
-              </a:rPr>
-              <a:t>) </a:t>
-            </a:r>
-            <a:r>
-              <a:rPr lang="en-US" dirty="0" err="1">
-                <a:latin typeface="Arial" panose="020B0604020202020204" pitchFamily="34" charset="0"/>
-                <a:cs typeface="Arial" panose="020B0604020202020204" pitchFamily="34" charset="0"/>
-              </a:rPr>
-              <a:t>Subdiv</a:t>
-            </a:r>
-            <a:r>
-              <a:rPr lang="en-US" dirty="0">
-                <a:latin typeface="Arial" panose="020B0604020202020204" pitchFamily="34" charset="0"/>
-                <a:cs typeface="Arial" panose="020B0604020202020204" pitchFamily="34" charset="0"/>
-              </a:rPr>
-              <a:t>(0,20){house</a:t>
-            </a:r>
-            <a:r>
-              <a:rPr lang="en-US" dirty="0" smtClean="0">
-                <a:latin typeface="Arial" panose="020B0604020202020204" pitchFamily="34" charset="0"/>
-                <a:cs typeface="Arial" panose="020B0604020202020204" pitchFamily="34" charset="0"/>
-              </a:rPr>
-              <a:t>} </a:t>
-            </a:r>
-          </a:p>
-          <a:p>
-            <a:pPr marL="0" indent="0">
-              <a:buNone/>
-            </a:pPr>
-            <a:r>
-              <a:rPr lang="en-US" dirty="0">
-                <a:latin typeface="Arial" panose="020B0604020202020204" pitchFamily="34" charset="0"/>
-                <a:cs typeface="Arial" panose="020B0604020202020204" pitchFamily="34" charset="0"/>
-              </a:rPr>
-              <a:t>wall1=</a:t>
-            </a:r>
-            <a:r>
-              <a:rPr lang="en-US" dirty="0" err="1">
-                <a:latin typeface="Arial" panose="020B0604020202020204" pitchFamily="34" charset="0"/>
-                <a:cs typeface="Arial" panose="020B0604020202020204" pitchFamily="34" charset="0"/>
-              </a:rPr>
-              <a:t>Subdiv</a:t>
-            </a:r>
-            <a:r>
-              <a:rPr lang="en-US" dirty="0">
-                <a:latin typeface="Arial" panose="020B0604020202020204" pitchFamily="34" charset="0"/>
-                <a:cs typeface="Arial" panose="020B0604020202020204" pitchFamily="34" charset="0"/>
-              </a:rPr>
-              <a:t>(1,5,10,5){wallpaper,wallMiddle1,wallpaper}:0.6</a:t>
-            </a:r>
-          </a:p>
-          <a:p>
-            <a:pPr marL="0" indent="0">
-              <a:buNone/>
-            </a:pPr>
-            <a:r>
-              <a:rPr lang="en-US" dirty="0">
-                <a:latin typeface="Arial" panose="020B0604020202020204" pitchFamily="34" charset="0"/>
-                <a:cs typeface="Arial" panose="020B0604020202020204" pitchFamily="34" charset="0"/>
-              </a:rPr>
-              <a:t>wall1=</a:t>
-            </a:r>
-            <a:r>
-              <a:rPr lang="en-US" dirty="0" err="1">
-                <a:latin typeface="Arial" panose="020B0604020202020204" pitchFamily="34" charset="0"/>
-                <a:cs typeface="Arial" panose="020B0604020202020204" pitchFamily="34" charset="0"/>
-              </a:rPr>
-              <a:t>Subdiv</a:t>
-            </a:r>
-            <a:r>
-              <a:rPr lang="en-US" dirty="0">
-                <a:latin typeface="Arial" panose="020B0604020202020204" pitchFamily="34" charset="0"/>
-                <a:cs typeface="Arial" panose="020B0604020202020204" pitchFamily="34" charset="0"/>
-              </a:rPr>
-              <a:t>(1,20){wallpaper}:</a:t>
-            </a:r>
-            <a:r>
-              <a:rPr lang="en-US" dirty="0" smtClean="0">
-                <a:latin typeface="Arial" panose="020B0604020202020204" pitchFamily="34" charset="0"/>
-                <a:cs typeface="Arial" panose="020B0604020202020204" pitchFamily="34" charset="0"/>
-              </a:rPr>
-              <a:t>0.4</a:t>
-            </a:r>
-          </a:p>
-          <a:p>
-            <a:r>
-              <a:rPr lang="en-US" dirty="0" smtClean="0">
-                <a:latin typeface="Arial" panose="020B0604020202020204" pitchFamily="34" charset="0"/>
-                <a:cs typeface="Arial" panose="020B0604020202020204" pitchFamily="34" charset="0"/>
-              </a:rPr>
-              <a:t>The file can have comments using at the beginning #</a:t>
-            </a:r>
-            <a:endParaRPr lang="en-US" dirty="0">
-              <a:latin typeface="Arial" panose="020B0604020202020204" pitchFamily="34" charset="0"/>
-              <a:cs typeface="Arial" panose="020B0604020202020204" pitchFamily="34" charset="0"/>
-            </a:endParaRPr>
-          </a:p>
-        </p:txBody>
-      </p:sp>
-    </p:spTree>
-    <p:extLst>
-      <p:ext uri="{BB962C8B-B14F-4D97-AF65-F5344CB8AC3E}">
-        <p14:creationId xmlns:p14="http://schemas.microsoft.com/office/powerpoint/2010/main" val="407787763"/>
-      </p:ext>
-    </p:extLst>
-  </p:cSld>
-  <p:clrMapOvr>
-    <a:masterClrMapping/>
-  </p:clrMapOvr>
-  <p:timing>
-    <p:tnLst>
-      <p:par>
-        <p:cTn id="1" dur="indefinite" restart="never" nodeType="tmRoot"/>
-      </p:par>
-    </p:tnLst>
-  </p:timing>
-</p:sld>
-</file>
-
-<file path=ppt/slides/slide4.xml><?xml version="1.0" encoding="utf-8"?>
-<p:sld xmlns:a="http://schemas.openxmlformats.org/drawingml/2006/main" xmlns:r="http://schemas.openxmlformats.org/officeDocument/2006/relationships" xmlns:p="http://schemas.openxmlformats.org/presentationml/2006/main">
-  <p:cSld>
-    <p:spTree>
-      <p:nvGrpSpPr>
-        <p:cNvPr id="1" name=""/>
-        <p:cNvGrpSpPr/>
-        <p:nvPr/>
-      </p:nvGrpSpPr>
-      <p:grpSpPr>
-        <a:xfrm>
-          <a:off x="0" y="0"/>
-          <a:ext cx="0" cy="0"/>
-          <a:chOff x="0" y="0"/>
-          <a:chExt cx="0" cy="0"/>
-        </a:xfrm>
-      </p:grpSpPr>
-      <p:sp>
-        <p:nvSpPr>
-          <p:cNvPr id="2" name="Title 1"/>
-          <p:cNvSpPr>
-            <a:spLocks noGrp="1"/>
-          </p:cNvSpPr>
-          <p:nvPr>
-            <p:ph type="title"/>
-          </p:nvPr>
-        </p:nvSpPr>
-        <p:spPr/>
-        <p:txBody>
-          <a:bodyPr/>
-          <a:lstStyle/>
-          <a:p>
-            <a:r>
-              <a:rPr lang="en-US" b="1" dirty="0"/>
-              <a:t>Procedural Grammar for Describing a Room</a:t>
-            </a:r>
-            <a:endParaRPr lang="en-US" dirty="0"/>
-          </a:p>
-        </p:txBody>
-      </p:sp>
-      <p:sp>
-        <p:nvSpPr>
-          <p:cNvPr id="3" name="Content Placeholder 2"/>
-          <p:cNvSpPr>
-            <a:spLocks noGrp="1"/>
-          </p:cNvSpPr>
-          <p:nvPr>
-            <p:ph idx="1"/>
-          </p:nvPr>
-        </p:nvSpPr>
-        <p:spPr>
-          <a:xfrm>
-            <a:off x="1484311" y="2348246"/>
-            <a:ext cx="10018713" cy="3769218"/>
-          </a:xfrm>
-        </p:spPr>
-        <p:txBody>
-          <a:bodyPr>
-            <a:normAutofit fontScale="85000" lnSpcReduction="20000"/>
-          </a:bodyPr>
-          <a:lstStyle/>
-          <a:p>
-            <a:r>
-              <a:rPr lang="en-US" dirty="0" smtClean="0">
-                <a:latin typeface="Arial" panose="020B0604020202020204" pitchFamily="34" charset="0"/>
-                <a:cs typeface="Arial" panose="020B0604020202020204" pitchFamily="34" charset="0"/>
-              </a:rPr>
-              <a:t>There are different operators that can be use: </a:t>
-            </a:r>
-          </a:p>
-          <a:p>
-            <a:r>
-              <a:rPr lang="en-US" b="1" dirty="0" smtClean="0">
-                <a:latin typeface="Arial" panose="020B0604020202020204" pitchFamily="34" charset="0"/>
-                <a:cs typeface="Arial" panose="020B0604020202020204" pitchFamily="34" charset="0"/>
-              </a:rPr>
-              <a:t>T(X,Y,Z) </a:t>
-            </a:r>
-            <a:r>
-              <a:rPr lang="en-US" dirty="0">
-                <a:latin typeface="Arial" panose="020B0604020202020204" pitchFamily="34" charset="0"/>
-                <a:cs typeface="Arial" panose="020B0604020202020204" pitchFamily="34" charset="0"/>
-              </a:rPr>
-              <a:t>: </a:t>
-            </a:r>
-            <a:r>
-              <a:rPr lang="en-US" dirty="0" smtClean="0">
-                <a:latin typeface="Arial" panose="020B0604020202020204" pitchFamily="34" charset="0"/>
-                <a:cs typeface="Arial" panose="020B0604020202020204" pitchFamily="34" charset="0"/>
-              </a:rPr>
-              <a:t>Translation of an object</a:t>
-            </a:r>
-          </a:p>
-          <a:p>
-            <a:r>
-              <a:rPr lang="en-US" b="1" dirty="0" smtClean="0">
-                <a:latin typeface="Arial" panose="020B0604020202020204" pitchFamily="34" charset="0"/>
-                <a:cs typeface="Arial" panose="020B0604020202020204" pitchFamily="34" charset="0"/>
-              </a:rPr>
-              <a:t>Comp(type){parameters} </a:t>
-            </a:r>
-            <a:r>
-              <a:rPr lang="en-US" dirty="0">
-                <a:latin typeface="Arial" panose="020B0604020202020204" pitchFamily="34" charset="0"/>
-                <a:cs typeface="Arial" panose="020B0604020202020204" pitchFamily="34" charset="0"/>
-              </a:rPr>
-              <a:t>: Split scope into plains</a:t>
-            </a:r>
-            <a:endParaRPr lang="en-US" dirty="0" smtClean="0">
-              <a:latin typeface="Arial" panose="020B0604020202020204" pitchFamily="34" charset="0"/>
-              <a:cs typeface="Arial" panose="020B0604020202020204" pitchFamily="34" charset="0"/>
-            </a:endParaRPr>
-          </a:p>
-          <a:p>
-            <a:r>
-              <a:rPr lang="en-US" b="1" dirty="0" err="1" smtClean="0">
-                <a:latin typeface="Arial" panose="020B0604020202020204" pitchFamily="34" charset="0"/>
-                <a:cs typeface="Arial" panose="020B0604020202020204" pitchFamily="34" charset="0"/>
-              </a:rPr>
-              <a:t>Subdiv</a:t>
-            </a:r>
-            <a:r>
-              <a:rPr lang="en-US" b="1" dirty="0" smtClean="0">
-                <a:latin typeface="Arial" panose="020B0604020202020204" pitchFamily="34" charset="0"/>
-                <a:cs typeface="Arial" panose="020B0604020202020204" pitchFamily="34" charset="0"/>
-              </a:rPr>
-              <a:t>(</a:t>
-            </a:r>
-            <a:r>
-              <a:rPr lang="en-US" b="1" dirty="0" err="1" smtClean="0">
-                <a:latin typeface="Arial" panose="020B0604020202020204" pitchFamily="34" charset="0"/>
-                <a:cs typeface="Arial" panose="020B0604020202020204" pitchFamily="34" charset="0"/>
-              </a:rPr>
-              <a:t>axis,arguments</a:t>
-            </a:r>
-            <a:r>
-              <a:rPr lang="en-US" b="1" dirty="0" smtClean="0">
-                <a:latin typeface="Arial" panose="020B0604020202020204" pitchFamily="34" charset="0"/>
-                <a:cs typeface="Arial" panose="020B0604020202020204" pitchFamily="34" charset="0"/>
-              </a:rPr>
-              <a:t>){parameters} </a:t>
-            </a:r>
-            <a:r>
-              <a:rPr lang="en-US" dirty="0">
-                <a:latin typeface="Arial" panose="020B0604020202020204" pitchFamily="34" charset="0"/>
-                <a:cs typeface="Arial" panose="020B0604020202020204" pitchFamily="34" charset="0"/>
-              </a:rPr>
-              <a:t>: Divide scope in smaller scopes (children</a:t>
-            </a:r>
-            <a:r>
-              <a:rPr lang="en-US" dirty="0" smtClean="0">
-                <a:latin typeface="Arial" panose="020B0604020202020204" pitchFamily="34" charset="0"/>
-                <a:cs typeface="Arial" panose="020B0604020202020204" pitchFamily="34" charset="0"/>
-              </a:rPr>
-              <a:t>)</a:t>
-            </a:r>
-          </a:p>
-          <a:p>
-            <a:r>
-              <a:rPr lang="en-US" b="1" dirty="0" smtClean="0">
-                <a:latin typeface="Arial" panose="020B0604020202020204" pitchFamily="34" charset="0"/>
-                <a:cs typeface="Arial" panose="020B0604020202020204" pitchFamily="34" charset="0"/>
-              </a:rPr>
-              <a:t>I(</a:t>
-            </a:r>
-            <a:r>
-              <a:rPr lang="en-US" b="1" dirty="0" err="1" smtClean="0">
-                <a:latin typeface="Arial" panose="020B0604020202020204" pitchFamily="34" charset="0"/>
-                <a:cs typeface="Arial" panose="020B0604020202020204" pitchFamily="34" charset="0"/>
-              </a:rPr>
-              <a:t>typeObject</a:t>
-            </a:r>
-            <a:r>
-              <a:rPr lang="en-US" b="1" dirty="0">
-                <a:latin typeface="Arial" panose="020B0604020202020204" pitchFamily="34" charset="0"/>
-                <a:cs typeface="Arial" panose="020B0604020202020204" pitchFamily="34" charset="0"/>
-              </a:rPr>
-              <a:t>){texture} </a:t>
-            </a:r>
-            <a:r>
-              <a:rPr lang="en-US" dirty="0">
-                <a:latin typeface="Arial" panose="020B0604020202020204" pitchFamily="34" charset="0"/>
-                <a:cs typeface="Arial" panose="020B0604020202020204" pitchFamily="34" charset="0"/>
-              </a:rPr>
-              <a:t>:  Instance of a </a:t>
-            </a:r>
-            <a:r>
-              <a:rPr lang="en-US" dirty="0" smtClean="0">
-                <a:latin typeface="Arial" panose="020B0604020202020204" pitchFamily="34" charset="0"/>
-                <a:cs typeface="Arial" panose="020B0604020202020204" pitchFamily="34" charset="0"/>
-              </a:rPr>
-              <a:t>figure</a:t>
-            </a:r>
-          </a:p>
-          <a:p>
-            <a:r>
-              <a:rPr lang="en-US" b="1" dirty="0">
-                <a:latin typeface="Arial" panose="020B0604020202020204" pitchFamily="34" charset="0"/>
-                <a:cs typeface="Arial" panose="020B0604020202020204" pitchFamily="34" charset="0"/>
-              </a:rPr>
-              <a:t>S(X,Y,Z)</a:t>
-            </a:r>
-            <a:r>
-              <a:rPr lang="en-US" dirty="0">
-                <a:latin typeface="Arial" panose="020B0604020202020204" pitchFamily="34" charset="0"/>
-                <a:cs typeface="Arial" panose="020B0604020202020204" pitchFamily="34" charset="0"/>
-              </a:rPr>
-              <a:t> : Set new </a:t>
-            </a:r>
-            <a:r>
-              <a:rPr lang="en-US" dirty="0" smtClean="0">
-                <a:latin typeface="Arial" panose="020B0604020202020204" pitchFamily="34" charset="0"/>
-                <a:cs typeface="Arial" panose="020B0604020202020204" pitchFamily="34" charset="0"/>
-              </a:rPr>
-              <a:t>size</a:t>
-            </a:r>
-          </a:p>
-          <a:p>
-            <a:r>
-              <a:rPr lang="en-US" b="1" dirty="0" smtClean="0">
-                <a:latin typeface="Arial" panose="020B0604020202020204" pitchFamily="34" charset="0"/>
-                <a:cs typeface="Arial" panose="020B0604020202020204" pitchFamily="34" charset="0"/>
-              </a:rPr>
-              <a:t>S3d(</a:t>
-            </a:r>
-            <a:r>
-              <a:rPr lang="en-US" b="1" dirty="0" err="1" smtClean="0">
-                <a:latin typeface="Arial" panose="020B0604020202020204" pitchFamily="34" charset="0"/>
-                <a:cs typeface="Arial" panose="020B0604020202020204" pitchFamily="34" charset="0"/>
-              </a:rPr>
-              <a:t>axis,size</a:t>
-            </a:r>
-            <a:r>
-              <a:rPr lang="en-US" b="1" dirty="0">
-                <a:latin typeface="Arial" panose="020B0604020202020204" pitchFamily="34" charset="0"/>
-                <a:cs typeface="Arial" panose="020B0604020202020204" pitchFamily="34" charset="0"/>
-              </a:rPr>
-              <a:t>)</a:t>
-            </a:r>
-            <a:r>
-              <a:rPr lang="en-US" dirty="0">
-                <a:latin typeface="Arial" panose="020B0604020202020204" pitchFamily="34" charset="0"/>
-                <a:cs typeface="Arial" panose="020B0604020202020204" pitchFamily="34" charset="0"/>
-              </a:rPr>
-              <a:t> : Set new size for an specific </a:t>
-            </a:r>
-            <a:r>
-              <a:rPr lang="en-US" dirty="0" smtClean="0">
-                <a:latin typeface="Arial" panose="020B0604020202020204" pitchFamily="34" charset="0"/>
-                <a:cs typeface="Arial" panose="020B0604020202020204" pitchFamily="34" charset="0"/>
-              </a:rPr>
-              <a:t>axis</a:t>
-            </a:r>
-          </a:p>
-          <a:p>
-            <a:r>
-              <a:rPr lang="en-US" b="1" dirty="0" smtClean="0">
-                <a:latin typeface="Arial" panose="020B0604020202020204" pitchFamily="34" charset="0"/>
-                <a:cs typeface="Arial" panose="020B0604020202020204" pitchFamily="34" charset="0"/>
-              </a:rPr>
-              <a:t>R(</a:t>
-            </a:r>
-            <a:r>
-              <a:rPr lang="en-US" b="1" dirty="0" err="1" smtClean="0">
-                <a:latin typeface="Arial" panose="020B0604020202020204" pitchFamily="34" charset="0"/>
-                <a:cs typeface="Arial" panose="020B0604020202020204" pitchFamily="34" charset="0"/>
-              </a:rPr>
-              <a:t>angleX,angley,angleZ</a:t>
-            </a:r>
-            <a:r>
-              <a:rPr lang="en-US" b="1" dirty="0">
-                <a:latin typeface="Arial" panose="020B0604020202020204" pitchFamily="34" charset="0"/>
-                <a:cs typeface="Arial" panose="020B0604020202020204" pitchFamily="34" charset="0"/>
-              </a:rPr>
-              <a:t>) </a:t>
-            </a:r>
-            <a:r>
-              <a:rPr lang="en-US" dirty="0">
-                <a:latin typeface="Arial" panose="020B0604020202020204" pitchFamily="34" charset="0"/>
-                <a:cs typeface="Arial" panose="020B0604020202020204" pitchFamily="34" charset="0"/>
-              </a:rPr>
-              <a:t>: Rotating around axis </a:t>
-            </a:r>
-            <a:endParaRPr lang="en-US" dirty="0" smtClean="0">
-              <a:latin typeface="Arial" panose="020B0604020202020204" pitchFamily="34" charset="0"/>
-              <a:cs typeface="Arial" panose="020B0604020202020204" pitchFamily="34" charset="0"/>
-            </a:endParaRPr>
-          </a:p>
-          <a:p>
-            <a:pPr marL="0" indent="0">
-              <a:buNone/>
-            </a:pPr>
-            <a:endParaRPr lang="en-US" dirty="0">
-              <a:latin typeface="Arial" panose="020B0604020202020204" pitchFamily="34" charset="0"/>
-              <a:cs typeface="Arial" panose="020B0604020202020204" pitchFamily="34" charset="0"/>
-            </a:endParaRPr>
-          </a:p>
-          <a:p>
-            <a:pPr marL="0" indent="0">
-              <a:buNone/>
-            </a:pPr>
-            <a:r>
-              <a:rPr lang="en-US" dirty="0" smtClean="0">
-                <a:latin typeface="Arial" panose="020B0604020202020204" pitchFamily="34" charset="0"/>
-                <a:cs typeface="Arial" panose="020B0604020202020204" pitchFamily="34" charset="0"/>
-              </a:rPr>
-              <a:t>Axis are X=0, Y=1, Z=2</a:t>
-            </a:r>
-            <a:endParaRPr lang="en-US" dirty="0">
-              <a:latin typeface="Arial" panose="020B0604020202020204" pitchFamily="34" charset="0"/>
-              <a:cs typeface="Arial" panose="020B0604020202020204" pitchFamily="34" charset="0"/>
-            </a:endParaRPr>
-          </a:p>
-        </p:txBody>
-      </p:sp>
-      <p:sp>
-        <p:nvSpPr>
-          <p:cNvPr id="4" name="TextBox 3"/>
-          <p:cNvSpPr txBox="1"/>
-          <p:nvPr/>
-        </p:nvSpPr>
-        <p:spPr>
-          <a:xfrm>
-            <a:off x="2575775" y="6334780"/>
-            <a:ext cx="9616225" cy="523220"/>
-          </a:xfrm>
-          <a:prstGeom prst="rect">
-            <a:avLst/>
-          </a:prstGeom>
-          <a:noFill/>
-        </p:spPr>
-        <p:txBody>
-          <a:bodyPr wrap="square" rtlCol="0">
-            <a:spAutoFit/>
-          </a:bodyPr>
-          <a:lstStyle/>
-          <a:p>
-            <a:r>
-              <a:rPr lang="en-US" sz="1400" dirty="0" smtClean="0">
-                <a:latin typeface="Arial" panose="020B0604020202020204" pitchFamily="34" charset="0"/>
-                <a:cs typeface="Arial" panose="020B0604020202020204" pitchFamily="34" charset="0"/>
-              </a:rPr>
-              <a:t>Taken:</a:t>
-            </a:r>
-          </a:p>
-          <a:p>
-            <a:r>
-              <a:rPr lang="en-US" sz="1400" dirty="0" smtClean="0">
-                <a:latin typeface="Arial" panose="020B0604020202020204" pitchFamily="34" charset="0"/>
-                <a:cs typeface="Arial" panose="020B0604020202020204" pitchFamily="34" charset="0"/>
-              </a:rPr>
-              <a:t>P. Muller, G. Zeng, P. Wonka, and L. Van </a:t>
-            </a:r>
-            <a:r>
-              <a:rPr lang="en-US" sz="1400" dirty="0" err="1" smtClean="0">
-                <a:latin typeface="Arial" panose="020B0604020202020204" pitchFamily="34" charset="0"/>
-                <a:cs typeface="Arial" panose="020B0604020202020204" pitchFamily="34" charset="0"/>
-              </a:rPr>
-              <a:t>Gool</a:t>
-            </a:r>
-            <a:r>
-              <a:rPr lang="en-US" sz="1400" dirty="0" smtClean="0">
-                <a:latin typeface="Arial" panose="020B0604020202020204" pitchFamily="34" charset="0"/>
-                <a:cs typeface="Arial" panose="020B0604020202020204" pitchFamily="34" charset="0"/>
-              </a:rPr>
-              <a:t>. Image-based ¨ procedural modeling of facades. In SIGGRAPH, 2007</a:t>
-            </a:r>
-            <a:endParaRPr lang="en-US" sz="1400" dirty="0">
-              <a:latin typeface="Arial" panose="020B0604020202020204" pitchFamily="34" charset="0"/>
-              <a:cs typeface="Arial" panose="020B0604020202020204" pitchFamily="34" charset="0"/>
-            </a:endParaRPr>
-          </a:p>
-        </p:txBody>
-      </p:sp>
-    </p:spTree>
-    <p:extLst>
-      <p:ext uri="{BB962C8B-B14F-4D97-AF65-F5344CB8AC3E}">
-        <p14:creationId xmlns:p14="http://schemas.microsoft.com/office/powerpoint/2010/main" val="2400364527"/>
-      </p:ext>
-    </p:extLst>
-  </p:cSld>
-  <p:clrMapOvr>
-    <a:masterClrMapping/>
-  </p:clrMapOvr>
-  <p:timing>
-    <p:tnLst>
-      <p:par>
-        <p:cTn id="1" dur="indefinite" restart="never" nodeType="tmRoot"/>
-      </p:par>
-    </p:tnLst>
-  </p:timing>
-</p:sld>
-</file>
-
-<file path=ppt/slides/slide5.xml><?xml version="1.0" encoding="utf-8"?>
-<p:sld xmlns:a="http://schemas.openxmlformats.org/drawingml/2006/main" xmlns:r="http://schemas.openxmlformats.org/officeDocument/2006/relationships" xmlns:p="http://schemas.openxmlformats.org/presentationml/2006/main">
-  <p:cSld>
-    <p:spTree>
-      <p:nvGrpSpPr>
-        <p:cNvPr id="1" name=""/>
-        <p:cNvGrpSpPr/>
-        <p:nvPr/>
-      </p:nvGrpSpPr>
-      <p:grpSpPr>
-        <a:xfrm>
-          <a:off x="0" y="0"/>
-          <a:ext cx="0" cy="0"/>
-          <a:chOff x="0" y="0"/>
-          <a:chExt cx="0" cy="0"/>
-        </a:xfrm>
-      </p:grpSpPr>
-      <p:sp>
-        <p:nvSpPr>
-          <p:cNvPr id="2" name="Title 1"/>
-          <p:cNvSpPr>
-            <a:spLocks noGrp="1"/>
-          </p:cNvSpPr>
-          <p:nvPr>
-            <p:ph type="title"/>
-          </p:nvPr>
-        </p:nvSpPr>
-        <p:spPr/>
-        <p:txBody>
-          <a:bodyPr/>
-          <a:lstStyle/>
-          <a:p>
-            <a:r>
-              <a:rPr lang="en-US" b="1" dirty="0"/>
-              <a:t>Procedural Grammar for Describing a Room</a:t>
-            </a:r>
-            <a:endParaRPr lang="en-US" dirty="0"/>
-          </a:p>
-        </p:txBody>
-      </p:sp>
-      <p:sp>
-        <p:nvSpPr>
-          <p:cNvPr id="3" name="Content Placeholder 2"/>
-          <p:cNvSpPr>
-            <a:spLocks noGrp="1"/>
-          </p:cNvSpPr>
-          <p:nvPr>
-            <p:ph idx="1"/>
-          </p:nvPr>
-        </p:nvSpPr>
-        <p:spPr/>
-        <p:txBody>
-          <a:bodyPr/>
-          <a:lstStyle/>
-          <a:p>
-            <a:r>
-              <a:rPr lang="en-US" dirty="0" smtClean="0">
-                <a:latin typeface="Arial" panose="020B0604020202020204" pitchFamily="34" charset="0"/>
-                <a:cs typeface="Arial" panose="020B0604020202020204" pitchFamily="34" charset="0"/>
-              </a:rPr>
-              <a:t>There are different </a:t>
-            </a:r>
-            <a:r>
-              <a:rPr lang="en-US" dirty="0" err="1" smtClean="0">
-                <a:latin typeface="Arial" panose="020B0604020202020204" pitchFamily="34" charset="0"/>
-                <a:cs typeface="Arial" panose="020B0604020202020204" pitchFamily="34" charset="0"/>
-              </a:rPr>
-              <a:t>typeObjects</a:t>
-            </a:r>
-            <a:r>
-              <a:rPr lang="en-US" dirty="0" smtClean="0">
-                <a:latin typeface="Arial" panose="020B0604020202020204" pitchFamily="34" charset="0"/>
-                <a:cs typeface="Arial" panose="020B0604020202020204" pitchFamily="34" charset="0"/>
-              </a:rPr>
-              <a:t>:</a:t>
-            </a:r>
-          </a:p>
-          <a:p>
-            <a:r>
-              <a:rPr lang="en-US" dirty="0" err="1">
-                <a:latin typeface="Arial" panose="020B0604020202020204" pitchFamily="34" charset="0"/>
-                <a:cs typeface="Arial" panose="020B0604020202020204" pitchFamily="34" charset="0"/>
-              </a:rPr>
-              <a:t>enum</a:t>
-            </a:r>
-            <a:r>
-              <a:rPr lang="en-US" dirty="0">
-                <a:latin typeface="Arial" panose="020B0604020202020204" pitchFamily="34" charset="0"/>
-                <a:cs typeface="Arial" panose="020B0604020202020204" pitchFamily="34" charset="0"/>
-              </a:rPr>
-              <a:t> </a:t>
-            </a:r>
-            <a:r>
-              <a:rPr lang="en-US" dirty="0" err="1">
-                <a:latin typeface="Arial" panose="020B0604020202020204" pitchFamily="34" charset="0"/>
-                <a:cs typeface="Arial" panose="020B0604020202020204" pitchFamily="34" charset="0"/>
-              </a:rPr>
-              <a:t>TypeObject</a:t>
-            </a:r>
-            <a:r>
-              <a:rPr lang="en-US" dirty="0">
-                <a:latin typeface="Arial" panose="020B0604020202020204" pitchFamily="34" charset="0"/>
-                <a:cs typeface="Arial" panose="020B0604020202020204" pitchFamily="34" charset="0"/>
-              </a:rPr>
-              <a:t> { INACTIVE, SCOPE, PLAIN, CUBE, CYLINDER, SOFA, TABLE, CABINET, CHAIR, TOY };</a:t>
-            </a:r>
-          </a:p>
-        </p:txBody>
-      </p:sp>
-    </p:spTree>
-    <p:extLst>
-      <p:ext uri="{BB962C8B-B14F-4D97-AF65-F5344CB8AC3E}">
-        <p14:creationId xmlns:p14="http://schemas.microsoft.com/office/powerpoint/2010/main" val="1606075839"/>
-      </p:ext>
-    </p:extLst>
-  </p:cSld>
-  <p:clrMapOvr>
-    <a:masterClrMapping/>
-  </p:clrMapOvr>
-  <p:timing>
-    <p:tnLst>
-      <p:par>
-        <p:cTn id="1" dur="indefinite" restart="never" nodeType="tmRoot"/>
-      </p:par>
-    </p:tnLst>
-  </p:timing>
-</p:sld>
-</file>
-
-<file path=ppt/slides/slide6.xml><?xml version="1.0" encoding="utf-8"?>
-<p:sld xmlns:a="http://schemas.openxmlformats.org/drawingml/2006/main" xmlns:r="http://schemas.openxmlformats.org/officeDocument/2006/relationships" xmlns:p="http://schemas.openxmlformats.org/presentationml/2006/main">
-  <p:cSld>
-    <p:spTree>
-      <p:nvGrpSpPr>
-        <p:cNvPr id="1" name=""/>
-        <p:cNvGrpSpPr/>
-        <p:nvPr/>
-      </p:nvGrpSpPr>
-      <p:grpSpPr>
-        <a:xfrm>
-          <a:off x="0" y="0"/>
-          <a:ext cx="0" cy="0"/>
-          <a:chOff x="0" y="0"/>
-          <a:chExt cx="0" cy="0"/>
-        </a:xfrm>
-      </p:grpSpPr>
-      <p:sp>
-        <p:nvSpPr>
-          <p:cNvPr id="2" name="Title 1"/>
-          <p:cNvSpPr>
-            <a:spLocks noGrp="1"/>
-          </p:cNvSpPr>
-          <p:nvPr>
-            <p:ph type="title"/>
-          </p:nvPr>
-        </p:nvSpPr>
-        <p:spPr/>
-        <p:txBody>
-          <a:bodyPr/>
-          <a:lstStyle/>
-          <a:p>
-            <a:r>
-              <a:rPr lang="en-US" b="1" dirty="0" smtClean="0"/>
-              <a:t>Parsing the File</a:t>
-            </a:r>
-            <a:endParaRPr lang="en-US" b="1" dirty="0"/>
-          </a:p>
-        </p:txBody>
-      </p:sp>
-      <p:sp>
-        <p:nvSpPr>
-          <p:cNvPr id="3" name="Content Placeholder 2"/>
-          <p:cNvSpPr>
-            <a:spLocks noGrp="1"/>
-          </p:cNvSpPr>
-          <p:nvPr>
-            <p:ph idx="1"/>
-          </p:nvPr>
-        </p:nvSpPr>
-        <p:spPr/>
-        <p:txBody>
-          <a:bodyPr>
-            <a:normAutofit fontScale="77500" lnSpcReduction="20000"/>
+            <a:normAutofit fontScale="92500" lnSpcReduction="10000"/>
           </a:bodyPr>
           <a:lstStyle/>
           <a:p>
@@ -7353,7 +6334,7 @@
                 <a:latin typeface="Arial" panose="020B0604020202020204" pitchFamily="34" charset="0"/>
                 <a:cs typeface="Arial" panose="020B0604020202020204" pitchFamily="34" charset="0"/>
               </a:rPr>
-              <a:t>Read the file and save it in a vector&lt;string&gt;.</a:t>
+              <a:t>Transform the modeler* tree in a vector&lt;modeler*&gt; model</a:t>
             </a:r>
           </a:p>
           <a:p>
@@ -7366,72 +6347,7 @@
                 <a:latin typeface="Arial" panose="020B0604020202020204" pitchFamily="34" charset="0"/>
                 <a:cs typeface="Arial" panose="020B0604020202020204" pitchFamily="34" charset="0"/>
               </a:rPr>
-              <a:t>Parse the vector&lt;string&gt; into a vector&lt;rule&gt;.</a:t>
-            </a:r>
-          </a:p>
-          <a:p>
-            <a:pPr marL="914400" lvl="1" indent="-457200">
-              <a:buFont typeface="+mj-lt"/>
-              <a:buAutoNum type="alphaLcPeriod"/>
-            </a:pPr>
-            <a:r>
-              <a:rPr lang="en-US" dirty="0" smtClean="0">
-                <a:latin typeface="Arial" panose="020B0604020202020204" pitchFamily="34" charset="0"/>
-                <a:cs typeface="Arial" panose="020B0604020202020204" pitchFamily="34" charset="0"/>
-              </a:rPr>
-              <a:t>Save the repeat heads in a temporal vector&lt;rule&gt;.</a:t>
-            </a:r>
-          </a:p>
-          <a:p>
-            <a:pPr marL="914400" lvl="1" indent="-457200">
-              <a:buFont typeface="+mj-lt"/>
-              <a:buAutoNum type="alphaLcPeriod"/>
-            </a:pPr>
-            <a:r>
-              <a:rPr lang="en-US" dirty="0" smtClean="0">
-                <a:latin typeface="Arial" panose="020B0604020202020204" pitchFamily="34" charset="0"/>
-                <a:cs typeface="Arial" panose="020B0604020202020204" pitchFamily="34" charset="0"/>
-              </a:rPr>
-              <a:t>Create a random between 0 and 1.</a:t>
-            </a:r>
-          </a:p>
-          <a:p>
-            <a:pPr marL="914400" lvl="1" indent="-457200">
-              <a:buFont typeface="+mj-lt"/>
-              <a:buAutoNum type="alphaLcPeriod"/>
-            </a:pPr>
-            <a:r>
-              <a:rPr lang="en-US" dirty="0" smtClean="0">
-                <a:latin typeface="Arial" panose="020B0604020202020204" pitchFamily="34" charset="0"/>
-                <a:cs typeface="Arial" panose="020B0604020202020204" pitchFamily="34" charset="0"/>
-              </a:rPr>
-              <a:t>Find the nearest probability with the random; save the winner in another vector&lt;rule&gt;.</a:t>
-            </a:r>
-          </a:p>
-          <a:p>
-            <a:pPr marL="914400" lvl="1" indent="-457200">
-              <a:buFont typeface="+mj-lt"/>
-              <a:buAutoNum type="alphaLcPeriod"/>
-            </a:pPr>
-            <a:r>
-              <a:rPr lang="en-US" dirty="0" smtClean="0">
-                <a:latin typeface="Arial" panose="020B0604020202020204" pitchFamily="34" charset="0"/>
-                <a:cs typeface="Arial" panose="020B0604020202020204" pitchFamily="34" charset="0"/>
-              </a:rPr>
-              <a:t>Erase the losers from the original vector&lt;rule&gt;.</a:t>
-            </a:r>
-          </a:p>
-          <a:p>
-            <a:pPr marL="914400" lvl="1" indent="-457200">
-              <a:buFont typeface="+mj-lt"/>
-              <a:buAutoNum type="alphaLcPeriod"/>
-            </a:pPr>
-            <a:r>
-              <a:rPr lang="en-US" dirty="0" smtClean="0">
-                <a:latin typeface="Arial" panose="020B0604020202020204" pitchFamily="34" charset="0"/>
-                <a:cs typeface="Arial" panose="020B0604020202020204" pitchFamily="34" charset="0"/>
-              </a:rPr>
-              <a:t>And repeat it until there is no more repeat heads.</a:t>
+              <a:t>Save the model in a global variable </a:t>
             </a:r>
           </a:p>
           <a:p>
@@ -7444,106 +6360,49 @@
                 <a:latin typeface="Arial" panose="020B0604020202020204" pitchFamily="34" charset="0"/>
                 <a:cs typeface="Arial" panose="020B0604020202020204" pitchFamily="34" charset="0"/>
               </a:rPr>
-              <a:t>Return the vector&lt;rule&gt;</a:t>
-            </a:r>
-          </a:p>
-          <a:p>
-            <a:pPr marL="914400" lvl="1" indent="-457200">
-              <a:buFont typeface="+mj-lt"/>
-              <a:buAutoNum type="alphaLcPeriod"/>
-            </a:pPr>
-            <a:endParaRPr lang="en-US" dirty="0"/>
-          </a:p>
-        </p:txBody>
-      </p:sp>
-    </p:spTree>
-    <p:extLst>
-      <p:ext uri="{BB962C8B-B14F-4D97-AF65-F5344CB8AC3E}">
-        <p14:creationId xmlns:p14="http://schemas.microsoft.com/office/powerpoint/2010/main" val="3732905569"/>
-      </p:ext>
-    </p:extLst>
-  </p:cSld>
-  <p:clrMapOvr>
-    <a:masterClrMapping/>
-  </p:clrMapOvr>
-  <p:timing>
-    <p:tnLst>
-      <p:par>
-        <p:cTn id="1" dur="indefinite" restart="never" nodeType="tmRoot"/>
-      </p:par>
-    </p:tnLst>
-  </p:timing>
-</p:sld>
-</file>
-
-<file path=ppt/slides/slide7.xml><?xml version="1.0" encoding="utf-8"?>
-<p:sld xmlns:a="http://schemas.openxmlformats.org/drawingml/2006/main" xmlns:r="http://schemas.openxmlformats.org/officeDocument/2006/relationships" xmlns:p="http://schemas.openxmlformats.org/presentationml/2006/main">
-  <p:cSld>
-    <p:spTree>
-      <p:nvGrpSpPr>
-        <p:cNvPr id="1" name=""/>
-        <p:cNvGrpSpPr/>
-        <p:nvPr/>
-      </p:nvGrpSpPr>
-      <p:grpSpPr>
-        <a:xfrm>
-          <a:off x="0" y="0"/>
-          <a:ext cx="0" cy="0"/>
-          <a:chOff x="0" y="0"/>
-          <a:chExt cx="0" cy="0"/>
-        </a:xfrm>
-      </p:grpSpPr>
-      <p:sp>
-        <p:nvSpPr>
-          <p:cNvPr id="2" name="Title 1"/>
-          <p:cNvSpPr>
-            <a:spLocks noGrp="1"/>
-          </p:cNvSpPr>
-          <p:nvPr>
-            <p:ph type="title"/>
-          </p:nvPr>
-        </p:nvSpPr>
-        <p:spPr/>
-        <p:txBody>
-          <a:bodyPr/>
-          <a:lstStyle/>
-          <a:p>
-            <a:r>
-              <a:rPr lang="en-US" b="1" dirty="0" smtClean="0"/>
-              <a:t>Modeler: Data Structure (Tree)</a:t>
-            </a:r>
-            <a:endParaRPr lang="en-US" b="1" dirty="0"/>
-          </a:p>
-        </p:txBody>
-      </p:sp>
-      <p:sp>
-        <p:nvSpPr>
-          <p:cNvPr id="3" name="Content Placeholder 2"/>
-          <p:cNvSpPr>
-            <a:spLocks noGrp="1"/>
-          </p:cNvSpPr>
-          <p:nvPr>
-            <p:ph idx="1"/>
-          </p:nvPr>
-        </p:nvSpPr>
-        <p:spPr>
-          <a:xfrm>
-            <a:off x="1484310" y="2215166"/>
-            <a:ext cx="10018713" cy="4237150"/>
-          </a:xfrm>
-        </p:spPr>
-        <p:txBody>
-          <a:bodyPr>
-            <a:normAutofit fontScale="70000" lnSpcReduction="20000"/>
-          </a:bodyPr>
-          <a:lstStyle/>
-          <a:p>
+              <a:t>Call the function </a:t>
+            </a:r>
+            <a:r>
+              <a:rPr lang="en-US" dirty="0" err="1" smtClean="0">
+                <a:latin typeface="Arial" panose="020B0604020202020204" pitchFamily="34" charset="0"/>
+                <a:cs typeface="Arial" panose="020B0604020202020204" pitchFamily="34" charset="0"/>
+              </a:rPr>
+              <a:t>drawTree</a:t>
+            </a:r>
             <a:r>
               <a:rPr lang="en-US" dirty="0" smtClean="0">
                 <a:latin typeface="Arial" panose="020B0604020202020204" pitchFamily="34" charset="0"/>
                 <a:cs typeface="Arial" panose="020B0604020202020204" pitchFamily="34" charset="0"/>
               </a:rPr>
-              <a:t>Steps:</a:t>
+              <a:t>(</a:t>
+            </a:r>
+            <a:r>
+              <a:rPr lang="en-US" dirty="0" err="1" smtClean="0">
+                <a:latin typeface="Arial" panose="020B0604020202020204" pitchFamily="34" charset="0"/>
+                <a:cs typeface="Arial" panose="020B0604020202020204" pitchFamily="34" charset="0"/>
+              </a:rPr>
+              <a:t>Shader</a:t>
+            </a:r>
+            <a:r>
+              <a:rPr lang="en-US" dirty="0" smtClean="0">
+                <a:latin typeface="Arial" panose="020B0604020202020204" pitchFamily="34" charset="0"/>
+                <a:cs typeface="Arial" panose="020B0604020202020204" pitchFamily="34" charset="0"/>
+              </a:rPr>
+              <a:t> </a:t>
+            </a:r>
+            <a:r>
+              <a:rPr lang="en-US" dirty="0" err="1" smtClean="0">
+                <a:latin typeface="Arial" panose="020B0604020202020204" pitchFamily="34" charset="0"/>
+                <a:cs typeface="Arial" panose="020B0604020202020204" pitchFamily="34" charset="0"/>
+              </a:rPr>
+              <a:t>ourShader</a:t>
+            </a:r>
+            <a:r>
+              <a:rPr lang="en-US" dirty="0" smtClean="0">
+                <a:latin typeface="Arial" panose="020B0604020202020204" pitchFamily="34" charset="0"/>
+                <a:cs typeface="Arial" panose="020B0604020202020204" pitchFamily="34" charset="0"/>
+              </a:rPr>
+              <a:t>)</a:t>
             </a:r>
           </a:p>
           <a:p>
@@ -7556,21 +6415,21 @@
                 <a:latin typeface="Arial" panose="020B0604020202020204" pitchFamily="34" charset="0"/>
                 <a:cs typeface="Arial" panose="020B0604020202020204" pitchFamily="34" charset="0"/>
               </a:rPr>
-              <a:t>Transform the vector&lt;rule&gt; into a map&lt;</a:t>
+              <a:t>Save the respective model in the </a:t>
             </a:r>
             <a:r>
               <a:rPr lang="en-US" dirty="0" err="1" smtClean="0">
                 <a:latin typeface="Arial" panose="020B0604020202020204" pitchFamily="34" charset="0"/>
                 <a:cs typeface="Arial" panose="020B0604020202020204" pitchFamily="34" charset="0"/>
               </a:rPr>
-              <a:t>string,string</a:t>
+              <a:t>ourShader</a:t>
             </a:r>
             <a:r>
               <a:rPr lang="en-US" dirty="0" smtClean="0">
                 <a:latin typeface="Arial" panose="020B0604020202020204" pitchFamily="34" charset="0"/>
                 <a:cs typeface="Arial" panose="020B0604020202020204" pitchFamily="34" charset="0"/>
               </a:rPr>
-              <a:t>&gt;</a:t>
+              <a:t> variable and render it.</a:t>
             </a:r>
           </a:p>
           <a:p>
@@ -7583,369 +6442,28 @@
                 <a:latin typeface="Arial" panose="020B0604020202020204" pitchFamily="34" charset="0"/>
                 <a:cs typeface="Arial" panose="020B0604020202020204" pitchFamily="34" charset="0"/>
               </a:rPr>
-              <a:t>Initialize the model (modeler* tree) and add the model in vector&lt;modeler*&gt; list (global variable)</a:t>
-            </a:r>
-          </a:p>
-          <a:p>
-            <a:pPr marL="457200" indent="-457200">
-              <a:buFont typeface="+mj-lt"/>
-              <a:buAutoNum type="arabicPeriod"/>
-            </a:pPr>
+              <a:t>The program permits zoom, movement in the scene with the </a:t>
+            </a:r>
             <a:r>
               <a:rPr lang="en-US" dirty="0" smtClean="0">
                 <a:latin typeface="Arial" panose="020B0604020202020204" pitchFamily="34" charset="0"/>
                 <a:cs typeface="Arial" panose="020B0604020202020204" pitchFamily="34" charset="0"/>
               </a:rPr>
-              <a:t>Copy the first model in the list in a temporal variable (modeler* </a:t>
-            </a:r>
-            <a:r>
-              <a:rPr lang="en-US" dirty="0" err="1" smtClean="0">
-                <a:latin typeface="Arial" panose="020B0604020202020204" pitchFamily="34" charset="0"/>
-                <a:cs typeface="Arial" panose="020B0604020202020204" pitchFamily="34" charset="0"/>
-              </a:rPr>
-              <a:t>currentModel</a:t>
+              <a:t>WASD</a:t>
             </a:r>
             <a:r>
               <a:rPr lang="en-US" dirty="0" smtClean="0">
                 <a:latin typeface="Arial" panose="020B0604020202020204" pitchFamily="34" charset="0"/>
                 <a:cs typeface="Arial" panose="020B0604020202020204" pitchFamily="34" charset="0"/>
               </a:rPr>
-              <a:t>) and extract the head in another variable (string </a:t>
-            </a:r>
-            <a:r>
-              <a:rPr lang="en-US" dirty="0" err="1" smtClean="0">
-                <a:latin typeface="Arial" panose="020B0604020202020204" pitchFamily="34" charset="0"/>
-                <a:cs typeface="Arial" panose="020B0604020202020204" pitchFamily="34" charset="0"/>
-              </a:rPr>
-              <a:t>modelerName</a:t>
+              <a:t>/arrow </a:t>
             </a:r>
             <a:r>
               <a:rPr lang="en-US" dirty="0" smtClean="0">
                 <a:latin typeface="Arial" panose="020B0604020202020204" pitchFamily="34" charset="0"/>
                 <a:cs typeface="Arial" panose="020B0604020202020204" pitchFamily="34" charset="0"/>
               </a:rPr>
-              <a:t>)</a:t>
-            </a:r>
-          </a:p>
-          <a:p>
-            <a:pPr marL="457200" indent="-457200">
-              <a:buFont typeface="+mj-lt"/>
-              <a:buAutoNum type="arabicPeriod"/>
-            </a:pPr>
-            <a:r>
-              <a:rPr lang="en-US" dirty="0" smtClean="0">
-                <a:latin typeface="Arial" panose="020B0604020202020204" pitchFamily="34" charset="0"/>
-                <a:cs typeface="Arial" panose="020B0604020202020204" pitchFamily="34" charset="0"/>
-              </a:rPr>
-              <a:t>Erase the first element of the list</a:t>
-            </a:r>
-          </a:p>
-          <a:p>
-            <a:pPr marL="457200" indent="-457200">
-              <a:buFont typeface="+mj-lt"/>
-              <a:buAutoNum type="arabicPeriod"/>
-            </a:pPr>
-            <a:r>
-              <a:rPr lang="en-US" dirty="0">
-                <a:latin typeface="Arial" panose="020B0604020202020204" pitchFamily="34" charset="0"/>
-                <a:cs typeface="Arial" panose="020B0604020202020204" pitchFamily="34" charset="0"/>
-              </a:rPr>
-              <a:t>Search in the map if the head </a:t>
-            </a:r>
-            <a:r>
-              <a:rPr lang="en-US" dirty="0" smtClean="0">
-                <a:latin typeface="Arial" panose="020B0604020202020204" pitchFamily="34" charset="0"/>
-                <a:cs typeface="Arial" panose="020B0604020202020204" pitchFamily="34" charset="0"/>
-              </a:rPr>
-              <a:t>exist with respect to </a:t>
-            </a:r>
-            <a:r>
-              <a:rPr lang="en-US" dirty="0" err="1">
-                <a:latin typeface="Arial" panose="020B0604020202020204" pitchFamily="34" charset="0"/>
-                <a:cs typeface="Arial" panose="020B0604020202020204" pitchFamily="34" charset="0"/>
-              </a:rPr>
-              <a:t>modelerName</a:t>
-            </a:r>
-            <a:endParaRPr lang="en-US" dirty="0" smtClean="0">
-              <a:latin typeface="Arial" panose="020B0604020202020204" pitchFamily="34" charset="0"/>
-              <a:cs typeface="Arial" panose="020B0604020202020204" pitchFamily="34" charset="0"/>
-            </a:endParaRPr>
-          </a:p>
-          <a:p>
-            <a:pPr marL="914400" lvl="1" indent="-457200">
-              <a:buFont typeface="+mj-lt"/>
-              <a:buAutoNum type="alphaLcPeriod"/>
-            </a:pPr>
-            <a:r>
-              <a:rPr lang="en-US" dirty="0" smtClean="0">
-                <a:latin typeface="Arial" panose="020B0604020202020204" pitchFamily="34" charset="0"/>
-                <a:cs typeface="Arial" panose="020B0604020202020204" pitchFamily="34" charset="0"/>
-              </a:rPr>
-              <a:t>Extract the rules and parse until have each operator rule (vector&lt;string&gt; keys)</a:t>
-            </a:r>
-          </a:p>
-          <a:p>
-            <a:pPr marL="914400" lvl="1" indent="-457200">
-              <a:buFont typeface="+mj-lt"/>
-              <a:buAutoNum type="alphaLcPeriod"/>
-            </a:pPr>
-            <a:r>
-              <a:rPr lang="en-US" dirty="0" smtClean="0">
-                <a:latin typeface="Arial" panose="020B0604020202020204" pitchFamily="34" charset="0"/>
-                <a:cs typeface="Arial" panose="020B0604020202020204" pitchFamily="34" charset="0"/>
-              </a:rPr>
-              <a:t>Compare if the keys start with (T,S,S3d,Subdiv,Comp,I,…)</a:t>
-            </a:r>
-          </a:p>
-          <a:p>
-            <a:pPr marL="914400" lvl="1" indent="-457200">
-              <a:buFont typeface="+mj-lt"/>
-              <a:buAutoNum type="alphaLcPeriod"/>
-            </a:pPr>
-            <a:r>
-              <a:rPr lang="en-US" dirty="0" smtClean="0">
-                <a:latin typeface="Arial" panose="020B0604020202020204" pitchFamily="34" charset="0"/>
-                <a:cs typeface="Arial" panose="020B0604020202020204" pitchFamily="34" charset="0"/>
-              </a:rPr>
-              <a:t>Transform the rules in model. If it contain children </a:t>
-            </a:r>
-            <a:r>
-              <a:rPr lang="en-US" dirty="0" err="1" smtClean="0">
-                <a:latin typeface="Arial" panose="020B0604020202020204" pitchFamily="34" charset="0"/>
-                <a:cs typeface="Arial" panose="020B0604020202020204" pitchFamily="34" charset="0"/>
-              </a:rPr>
-              <a:t>e.g</a:t>
-            </a:r>
-            <a:r>
-              <a:rPr lang="en-US" dirty="0" smtClean="0">
-                <a:latin typeface="Arial" panose="020B0604020202020204" pitchFamily="34" charset="0"/>
-                <a:cs typeface="Arial" panose="020B0604020202020204" pitchFamily="34" charset="0"/>
-              </a:rPr>
-              <a:t> </a:t>
-            </a:r>
-            <a:r>
-              <a:rPr lang="en-US" dirty="0" err="1" smtClean="0">
-                <a:latin typeface="Arial" panose="020B0604020202020204" pitchFamily="34" charset="0"/>
-                <a:cs typeface="Arial" panose="020B0604020202020204" pitchFamily="34" charset="0"/>
-              </a:rPr>
-              <a:t>Subdiv</a:t>
-            </a:r>
-            <a:r>
-              <a:rPr lang="en-US" dirty="0" smtClean="0">
-                <a:latin typeface="Arial" panose="020B0604020202020204" pitchFamily="34" charset="0"/>
-                <a:cs typeface="Arial" panose="020B0604020202020204" pitchFamily="34" charset="0"/>
-              </a:rPr>
-              <a:t> then save it in the model but also adding it to the vector&lt;modeler*&gt; list</a:t>
-            </a:r>
-          </a:p>
-          <a:p>
-            <a:pPr marL="457200" indent="-457200">
-              <a:buFont typeface="+mj-lt"/>
-              <a:buAutoNum type="arabicPeriod"/>
-            </a:pPr>
-            <a:r>
-              <a:rPr lang="en-US" dirty="0" smtClean="0">
-                <a:latin typeface="Arial" panose="020B0604020202020204" pitchFamily="34" charset="0"/>
-                <a:cs typeface="Arial" panose="020B0604020202020204" pitchFamily="34" charset="0"/>
-              </a:rPr>
-              <a:t>Do the process until there is no more models in the list</a:t>
-            </a:r>
-          </a:p>
-          <a:p>
-            <a:pPr marL="457200" indent="-457200">
-              <a:buFont typeface="+mj-lt"/>
-              <a:buAutoNum type="arabicPeriod"/>
-            </a:pPr>
-            <a:r>
-              <a:rPr lang="en-US" dirty="0" smtClean="0">
-                <a:latin typeface="Arial" panose="020B0604020202020204" pitchFamily="34" charset="0"/>
-                <a:cs typeface="Arial" panose="020B0604020202020204" pitchFamily="34" charset="0"/>
-              </a:rPr>
-              <a:t>Return the tree</a:t>
-            </a:r>
-          </a:p>
-          <a:p>
-            <a:pPr marL="457200" indent="-457200">
-              <a:buFont typeface="+mj-lt"/>
-              <a:buAutoNum type="arabicPeriod"/>
-            </a:pPr>
-            <a:endParaRPr lang="en-US" dirty="0">
-              <a:latin typeface="Arial" panose="020B0604020202020204" pitchFamily="34" charset="0"/>
-              <a:cs typeface="Arial" panose="020B0604020202020204" pitchFamily="34" charset="0"/>
-            </a:endParaRPr>
-          </a:p>
-        </p:txBody>
-      </p:sp>
-    </p:spTree>
-    <p:extLst>
-      <p:ext uri="{BB962C8B-B14F-4D97-AF65-F5344CB8AC3E}">
-        <p14:creationId xmlns:p14="http://schemas.microsoft.com/office/powerpoint/2010/main" val="397944075"/>
-      </p:ext>
-    </p:extLst>
-  </p:cSld>
-  <p:clrMapOvr>
-    <a:masterClrMapping/>
-  </p:clrMapOvr>
-  <p:timing>
-    <p:tnLst>
-      <p:par>
-        <p:cTn id="1" dur="indefinite" restart="never" nodeType="tmRoot"/>
-      </p:par>
-    </p:tnLst>
-  </p:timing>
-</p:sld>
-</file>
-
-<file path=ppt/slides/slide8.xml><?xml version="1.0" encoding="utf-8"?>
-<p:sld xmlns:a="http://schemas.openxmlformats.org/drawingml/2006/main" xmlns:r="http://schemas.openxmlformats.org/officeDocument/2006/relationships" xmlns:p="http://schemas.openxmlformats.org/presentationml/2006/main">
-  <p:cSld>
-    <p:spTree>
-      <p:nvGrpSpPr>
-        <p:cNvPr id="1" name=""/>
-        <p:cNvGrpSpPr/>
-        <p:nvPr/>
-      </p:nvGrpSpPr>
-      <p:grpSpPr>
-        <a:xfrm>
-          <a:off x="0" y="0"/>
-          <a:ext cx="0" cy="0"/>
-          <a:chOff x="0" y="0"/>
-          <a:chExt cx="0" cy="0"/>
-        </a:xfrm>
-      </p:grpSpPr>
-      <p:sp>
-        <p:nvSpPr>
-          <p:cNvPr id="2" name="Title 1"/>
-          <p:cNvSpPr>
-            <a:spLocks noGrp="1"/>
-          </p:cNvSpPr>
-          <p:nvPr>
-            <p:ph type="title"/>
-          </p:nvPr>
-        </p:nvSpPr>
-        <p:spPr/>
-        <p:txBody>
-          <a:bodyPr/>
-          <a:lstStyle/>
-          <a:p>
-            <a:r>
-              <a:rPr lang="en-US" b="1" dirty="0" smtClean="0"/>
-              <a:t>Result to Rendering</a:t>
-            </a:r>
-            <a:endParaRPr lang="en-US" b="1" dirty="0"/>
-          </a:p>
-        </p:txBody>
-      </p:sp>
-      <p:sp>
-        <p:nvSpPr>
-          <p:cNvPr id="3" name="Content Placeholder 2"/>
-          <p:cNvSpPr>
-            <a:spLocks noGrp="1"/>
-          </p:cNvSpPr>
-          <p:nvPr>
-            <p:ph idx="1"/>
-          </p:nvPr>
-        </p:nvSpPr>
-        <p:spPr/>
-        <p:txBody>
-          <a:bodyPr>
-            <a:normAutofit fontScale="92500" lnSpcReduction="10000"/>
-          </a:bodyPr>
-          <a:lstStyle/>
-          <a:p>
-            <a:r>
-              <a:rPr lang="en-US" dirty="0" smtClean="0"/>
-              <a:t>Steps:</a:t>
-            </a:r>
-          </a:p>
-          <a:p>
-            <a:pPr marL="457200" indent="-457200">
-              <a:buFont typeface="+mj-lt"/>
-              <a:buAutoNum type="arabicPeriod"/>
-            </a:pPr>
-            <a:r>
-              <a:rPr lang="en-US" dirty="0" smtClean="0"/>
-              <a:t>Transform the modeler* tree in a vector&lt;modeler*&gt; model</a:t>
-            </a:r>
-          </a:p>
-          <a:p>
-            <a:pPr marL="457200" indent="-457200">
-              <a:buFont typeface="+mj-lt"/>
-              <a:buAutoNum type="arabicPeriod"/>
-            </a:pPr>
-            <a:r>
-              <a:rPr lang="en-US" dirty="0" smtClean="0"/>
-              <a:t>Save the model in a global variable </a:t>
-            </a:r>
-          </a:p>
-          <a:p>
-            <a:pPr marL="457200" indent="-457200">
-              <a:buFont typeface="+mj-lt"/>
-              <a:buAutoNum type="arabicPeriod"/>
-            </a:pPr>
-            <a:r>
-              <a:rPr lang="en-US" dirty="0" smtClean="0"/>
-              <a:t>Call the function </a:t>
-            </a:r>
-            <a:r>
-              <a:rPr lang="en-US" dirty="0" err="1" smtClean="0"/>
-              <a:t>drawTree</a:t>
-            </a:r>
-            <a:r>
-              <a:rPr lang="en-US" dirty="0" smtClean="0"/>
-              <a:t>(</a:t>
-            </a:r>
-            <a:r>
-              <a:rPr lang="en-US" dirty="0" err="1" smtClean="0"/>
-              <a:t>Shader</a:t>
-            </a:r>
-            <a:r>
-              <a:rPr lang="en-US" dirty="0" smtClean="0"/>
-              <a:t> </a:t>
-            </a:r>
-            <a:r>
-              <a:rPr lang="en-US" dirty="0" err="1" smtClean="0"/>
-              <a:t>ourShader</a:t>
-            </a:r>
-            <a:r>
-              <a:rPr lang="en-US" dirty="0" smtClean="0"/>
-              <a:t>)</a:t>
-            </a:r>
-          </a:p>
-          <a:p>
-            <a:pPr marL="457200" indent="-457200">
-              <a:buFont typeface="+mj-lt"/>
-              <a:buAutoNum type="arabicPeriod"/>
-            </a:pPr>
-            <a:r>
-              <a:rPr lang="en-US" dirty="0" smtClean="0"/>
-              <a:t>Save the respective model in the </a:t>
-            </a:r>
-            <a:r>
-              <a:rPr lang="en-US" dirty="0" err="1" smtClean="0"/>
-              <a:t>ourShader</a:t>
-            </a:r>
-            <a:r>
-              <a:rPr lang="en-US" dirty="0" smtClean="0"/>
-              <a:t> variable and render it.</a:t>
-            </a:r>
-          </a:p>
-          <a:p>
-            <a:pPr marL="457200" indent="-457200">
-              <a:buFont typeface="+mj-lt"/>
-              <a:buAutoNum type="arabicPeriod"/>
-            </a:pPr>
-            <a:r>
-              <a:rPr lang="en-US" dirty="0" smtClean="0"/>
-              <a:t>The program permits zoom, movement in the scene with the </a:t>
-            </a:r>
-            <a:r>
-              <a:rPr lang="en-US" dirty="0" err="1" smtClean="0"/>
-              <a:t>wasd</a:t>
-            </a:r>
-            <a:r>
-              <a:rPr lang="en-US" dirty="0" smtClean="0"/>
-              <a:t>/arrow keys and mouse.</a:t>
+              <a:t>keys and mouse.</a:t>
             </a:r>
           </a:p>
         </p:txBody>
@@ -7970,7 +6488,7 @@
 </p:sld>
 </file>
 
-<file path=ppt/slides/slide9.xml><?xml version="1.0" encoding="utf-8"?>
+<file path=ppt/slides/slide11.xml><?xml version="1.0" encoding="utf-8"?>
 <p:sld xmlns:a="http://schemas.openxmlformats.org/drawingml/2006/main" xmlns:r="http://schemas.openxmlformats.org/officeDocument/2006/relationships" xmlns:p="http://schemas.openxmlformats.org/presentationml/2006/main">
   <p:cSld>
     <p:spTree>
@@ -8139,6 +6657,1797 @@
   <p:clrMapOvr>
     <a:masterClrMapping/>
   </p:clrMapOvr>
+</p:sld>
+</file>
+
+<file path=ppt/slides/slide12.xml><?xml version="1.0" encoding="utf-8"?>
+<p:sld xmlns:a="http://schemas.openxmlformats.org/drawingml/2006/main" xmlns:r="http://schemas.openxmlformats.org/officeDocument/2006/relationships" xmlns:p="http://schemas.openxmlformats.org/presentationml/2006/main">
+  <p:cSld>
+    <p:spTree>
+      <p:nvGrpSpPr>
+        <p:cNvPr id="1" name=""/>
+        <p:cNvGrpSpPr/>
+        <p:nvPr/>
+      </p:nvGrpSpPr>
+      <p:grpSpPr>
+        <a:xfrm>
+          <a:off x="0" y="0"/>
+          <a:ext cx="0" cy="0"/>
+          <a:chOff x="0" y="0"/>
+          <a:chExt cx="0" cy="0"/>
+        </a:xfrm>
+      </p:grpSpPr>
+      <p:sp>
+        <p:nvSpPr>
+          <p:cNvPr id="4" name="Title 3"/>
+          <p:cNvSpPr>
+            <a:spLocks noGrp="1"/>
+          </p:cNvSpPr>
+          <p:nvPr>
+            <p:ph type="ctrTitle"/>
+          </p:nvPr>
+        </p:nvSpPr>
+        <p:spPr/>
+        <p:txBody>
+          <a:bodyPr/>
+          <a:lstStyle/>
+          <a:p>
+            <a:r>
+              <a:rPr lang="en-US" b="1" dirty="0" smtClean="0"/>
+              <a:t>Thank you. </a:t>
+            </a:r>
+            <a:br>
+              <a:rPr lang="en-US" b="1" dirty="0" smtClean="0"/>
+            </a:br>
+            <a:r>
+              <a:rPr lang="en-US" dirty="0" smtClean="0"/>
+              <a:t>Questions?</a:t>
+            </a:r>
+            <a:endParaRPr lang="en-US" dirty="0"/>
+          </a:p>
+        </p:txBody>
+      </p:sp>
+    </p:spTree>
+    <p:extLst>
+      <p:ext uri="{BB962C8B-B14F-4D97-AF65-F5344CB8AC3E}">
+        <p14:creationId xmlns:p14="http://schemas.microsoft.com/office/powerpoint/2010/main" val="2282552027"/>
+      </p:ext>
+    </p:extLst>
+  </p:cSld>
+  <p:clrMapOvr>
+    <a:masterClrMapping/>
+  </p:clrMapOvr>
+</p:sld>
+</file>
+
+<file path=ppt/slides/slide2.xml><?xml version="1.0" encoding="utf-8"?>
+<p:sld xmlns:a="http://schemas.openxmlformats.org/drawingml/2006/main" xmlns:r="http://schemas.openxmlformats.org/officeDocument/2006/relationships" xmlns:p="http://schemas.openxmlformats.org/presentationml/2006/main">
+  <p:cSld>
+    <p:spTree>
+      <p:nvGrpSpPr>
+        <p:cNvPr id="1" name=""/>
+        <p:cNvGrpSpPr/>
+        <p:nvPr/>
+      </p:nvGrpSpPr>
+      <p:grpSpPr>
+        <a:xfrm>
+          <a:off x="0" y="0"/>
+          <a:ext cx="0" cy="0"/>
+          <a:chOff x="0" y="0"/>
+          <a:chExt cx="0" cy="0"/>
+        </a:xfrm>
+      </p:grpSpPr>
+      <p:sp>
+        <p:nvSpPr>
+          <p:cNvPr id="2" name="Title 1"/>
+          <p:cNvSpPr>
+            <a:spLocks noGrp="1"/>
+          </p:cNvSpPr>
+          <p:nvPr>
+            <p:ph type="title"/>
+          </p:nvPr>
+        </p:nvSpPr>
+        <p:spPr/>
+        <p:txBody>
+          <a:bodyPr/>
+          <a:lstStyle/>
+          <a:p>
+            <a:r>
+              <a:rPr lang="en-US" b="1" dirty="0" smtClean="0"/>
+              <a:t>Modeling</a:t>
+            </a:r>
+            <a:endParaRPr lang="en-US" b="1" dirty="0"/>
+          </a:p>
+        </p:txBody>
+      </p:sp>
+      <p:sp>
+        <p:nvSpPr>
+          <p:cNvPr id="3" name="Content Placeholder 2"/>
+          <p:cNvSpPr>
+            <a:spLocks noGrp="1"/>
+          </p:cNvSpPr>
+          <p:nvPr>
+            <p:ph idx="1"/>
+          </p:nvPr>
+        </p:nvSpPr>
+        <p:spPr>
+          <a:xfrm>
+            <a:off x="1484310" y="2253803"/>
+            <a:ext cx="10018713" cy="3537397"/>
+          </a:xfrm>
+        </p:spPr>
+        <p:txBody>
+          <a:bodyPr>
+            <a:normAutofit/>
+          </a:bodyPr>
+          <a:lstStyle/>
+          <a:p>
+            <a:r>
+              <a:rPr lang="en-US" dirty="0" smtClean="0">
+                <a:latin typeface="Arial" panose="020B0604020202020204" pitchFamily="34" charset="0"/>
+                <a:cs typeface="Arial" panose="020B0604020202020204" pitchFamily="34" charset="0"/>
+              </a:rPr>
+              <a:t>Define </a:t>
+            </a:r>
+            <a:r>
+              <a:rPr lang="en-US" dirty="0">
+                <a:latin typeface="Arial" panose="020B0604020202020204" pitchFamily="34" charset="0"/>
+                <a:cs typeface="Arial" panose="020B0604020202020204" pitchFamily="34" charset="0"/>
+              </a:rPr>
+              <a:t>a procedural grammar suitable for describing a room (including windows, doors, ...).</a:t>
+            </a:r>
+          </a:p>
+          <a:p>
+            <a:r>
+              <a:rPr lang="en-US" dirty="0">
+                <a:latin typeface="Arial" panose="020B0604020202020204" pitchFamily="34" charset="0"/>
+                <a:cs typeface="Arial" panose="020B0604020202020204" pitchFamily="34" charset="0"/>
+              </a:rPr>
+              <a:t>Parse a grammar file of such a procedural description</a:t>
+            </a:r>
+            <a:r>
+              <a:rPr lang="en-US" dirty="0" smtClean="0">
+                <a:latin typeface="Arial" panose="020B0604020202020204" pitchFamily="34" charset="0"/>
+                <a:cs typeface="Arial" panose="020B0604020202020204" pitchFamily="34" charset="0"/>
+              </a:rPr>
+              <a:t>.</a:t>
+            </a:r>
+          </a:p>
+          <a:p>
+            <a:r>
+              <a:rPr lang="en-US" dirty="0" smtClean="0">
+                <a:latin typeface="Arial" panose="020B0604020202020204" pitchFamily="34" charset="0"/>
+                <a:cs typeface="Arial" panose="020B0604020202020204" pitchFamily="34" charset="0"/>
+              </a:rPr>
+              <a:t>Define </a:t>
+            </a:r>
+            <a:r>
+              <a:rPr lang="en-US" dirty="0">
+                <a:latin typeface="Arial" panose="020B0604020202020204" pitchFamily="34" charset="0"/>
+                <a:cs typeface="Arial" panose="020B0604020202020204" pitchFamily="34" charset="0"/>
+              </a:rPr>
+              <a:t>the data structure for grammar and geometry (tree structure).</a:t>
+            </a:r>
+          </a:p>
+          <a:p>
+            <a:r>
+              <a:rPr lang="en-US" dirty="0" smtClean="0">
+                <a:latin typeface="Arial" panose="020B0604020202020204" pitchFamily="34" charset="0"/>
+                <a:cs typeface="Arial" panose="020B0604020202020204" pitchFamily="34" charset="0"/>
+              </a:rPr>
+              <a:t>Apply </a:t>
+            </a:r>
+            <a:r>
+              <a:rPr lang="en-US" dirty="0">
+                <a:latin typeface="Arial" panose="020B0604020202020204" pitchFamily="34" charset="0"/>
+                <a:cs typeface="Arial" panose="020B0604020202020204" pitchFamily="34" charset="0"/>
+              </a:rPr>
+              <a:t>procedural rules, generate room geometry and store it into the data structure.</a:t>
+            </a:r>
+          </a:p>
+          <a:p>
+            <a:r>
+              <a:rPr lang="en-US" dirty="0">
+                <a:latin typeface="Arial" panose="020B0604020202020204" pitchFamily="34" charset="0"/>
+                <a:cs typeface="Arial" panose="020B0604020202020204" pitchFamily="34" charset="0"/>
+              </a:rPr>
+              <a:t>Pass the intermediate result to renderer</a:t>
+            </a:r>
+            <a:r>
+              <a:rPr lang="en-US" dirty="0" smtClean="0">
+                <a:latin typeface="Arial" panose="020B0604020202020204" pitchFamily="34" charset="0"/>
+                <a:cs typeface="Arial" panose="020B0604020202020204" pitchFamily="34" charset="0"/>
+              </a:rPr>
+              <a:t>.</a:t>
+            </a:r>
+            <a:endParaRPr lang="en-US" dirty="0">
+              <a:latin typeface="Arial" panose="020B0604020202020204" pitchFamily="34" charset="0"/>
+              <a:cs typeface="Arial" panose="020B0604020202020204" pitchFamily="34" charset="0"/>
+            </a:endParaRPr>
+          </a:p>
+        </p:txBody>
+      </p:sp>
+    </p:spTree>
+    <p:extLst>
+      <p:ext uri="{BB962C8B-B14F-4D97-AF65-F5344CB8AC3E}">
+        <p14:creationId xmlns:p14="http://schemas.microsoft.com/office/powerpoint/2010/main" val="1629815597"/>
+      </p:ext>
+    </p:extLst>
+  </p:cSld>
+  <p:clrMapOvr>
+    <a:masterClrMapping/>
+  </p:clrMapOvr>
+  <p:timing>
+    <p:tnLst>
+      <p:par>
+        <p:cTn id="1" dur="indefinite" restart="never" nodeType="tmRoot"/>
+      </p:par>
+    </p:tnLst>
+  </p:timing>
+</p:sld>
+</file>
+
+<file path=ppt/slides/slide3.xml><?xml version="1.0" encoding="utf-8"?>
+<p:sld xmlns:a="http://schemas.openxmlformats.org/drawingml/2006/main" xmlns:r="http://schemas.openxmlformats.org/officeDocument/2006/relationships" xmlns:p="http://schemas.openxmlformats.org/presentationml/2006/main">
+  <p:cSld>
+    <p:spTree>
+      <p:nvGrpSpPr>
+        <p:cNvPr id="1" name=""/>
+        <p:cNvGrpSpPr/>
+        <p:nvPr/>
+      </p:nvGrpSpPr>
+      <p:grpSpPr>
+        <a:xfrm>
+          <a:off x="0" y="0"/>
+          <a:ext cx="0" cy="0"/>
+          <a:chOff x="0" y="0"/>
+          <a:chExt cx="0" cy="0"/>
+        </a:xfrm>
+      </p:grpSpPr>
+      <p:sp>
+        <p:nvSpPr>
+          <p:cNvPr id="2" name="Title 1"/>
+          <p:cNvSpPr>
+            <a:spLocks noGrp="1"/>
+          </p:cNvSpPr>
+          <p:nvPr>
+            <p:ph type="title"/>
+          </p:nvPr>
+        </p:nvSpPr>
+        <p:spPr/>
+        <p:txBody>
+          <a:bodyPr/>
+          <a:lstStyle/>
+          <a:p>
+            <a:r>
+              <a:rPr lang="en-US" b="1" dirty="0"/>
+              <a:t>P</a:t>
+            </a:r>
+            <a:r>
+              <a:rPr lang="en-US" b="1" dirty="0" smtClean="0"/>
+              <a:t>rocedural Grammar for Describing </a:t>
+            </a:r>
+            <a:r>
+              <a:rPr lang="en-US" b="1" dirty="0"/>
+              <a:t>a </a:t>
+            </a:r>
+            <a:r>
+              <a:rPr lang="en-US" b="1" dirty="0" smtClean="0"/>
+              <a:t>Room</a:t>
+            </a:r>
+            <a:endParaRPr lang="en-US" b="1" dirty="0"/>
+          </a:p>
+        </p:txBody>
+      </p:sp>
+      <p:sp>
+        <p:nvSpPr>
+          <p:cNvPr id="3" name="Content Placeholder 2"/>
+          <p:cNvSpPr>
+            <a:spLocks noGrp="1"/>
+          </p:cNvSpPr>
+          <p:nvPr>
+            <p:ph idx="1"/>
+          </p:nvPr>
+        </p:nvSpPr>
+        <p:spPr>
+          <a:xfrm>
+            <a:off x="1484310" y="2666999"/>
+            <a:ext cx="10018713" cy="3437587"/>
+          </a:xfrm>
+        </p:spPr>
+        <p:txBody>
+          <a:bodyPr>
+            <a:normAutofit lnSpcReduction="10000"/>
+          </a:bodyPr>
+          <a:lstStyle/>
+          <a:p>
+            <a:r>
+              <a:rPr lang="en-US" dirty="0" smtClean="0">
+                <a:latin typeface="Arial" panose="020B0604020202020204" pitchFamily="34" charset="0"/>
+                <a:cs typeface="Arial" panose="020B0604020202020204" pitchFamily="34" charset="0"/>
+              </a:rPr>
+              <a:t>Definition of a rule:</a:t>
+            </a:r>
+          </a:p>
+          <a:p>
+            <a:pPr marL="0" indent="0">
+              <a:buNone/>
+            </a:pPr>
+            <a:r>
+              <a:rPr lang="en-US" dirty="0" smtClean="0">
+                <a:latin typeface="Arial" panose="020B0604020202020204" pitchFamily="34" charset="0"/>
+                <a:cs typeface="Arial" panose="020B0604020202020204" pitchFamily="34" charset="0"/>
+              </a:rPr>
+              <a:t>Head</a:t>
+            </a:r>
+            <a:r>
+              <a:rPr lang="en-US" b="1" dirty="0" smtClean="0">
+                <a:latin typeface="Arial" panose="020B0604020202020204" pitchFamily="34" charset="0"/>
+                <a:cs typeface="Arial" panose="020B0604020202020204" pitchFamily="34" charset="0"/>
+              </a:rPr>
+              <a:t>=</a:t>
+            </a:r>
+            <a:r>
+              <a:rPr lang="en-US" dirty="0" smtClean="0">
+                <a:latin typeface="Arial" panose="020B0604020202020204" pitchFamily="34" charset="0"/>
+                <a:cs typeface="Arial" panose="020B0604020202020204" pitchFamily="34" charset="0"/>
+              </a:rPr>
+              <a:t>Rules </a:t>
+            </a:r>
+            <a:r>
+              <a:rPr lang="en-US" dirty="0" err="1" smtClean="0">
+                <a:latin typeface="Arial" panose="020B0604020202020204" pitchFamily="34" charset="0"/>
+                <a:cs typeface="Arial" panose="020B0604020202020204" pitchFamily="34" charset="0"/>
+              </a:rPr>
+              <a:t>operators</a:t>
+            </a:r>
+            <a:r>
+              <a:rPr lang="en-US" b="1" dirty="0" err="1" smtClean="0">
+                <a:latin typeface="Arial" panose="020B0604020202020204" pitchFamily="34" charset="0"/>
+                <a:cs typeface="Arial" panose="020B0604020202020204" pitchFamily="34" charset="0"/>
+              </a:rPr>
+              <a:t>:</a:t>
+            </a:r>
+            <a:r>
+              <a:rPr lang="en-US" dirty="0" err="1" smtClean="0">
+                <a:latin typeface="Arial" panose="020B0604020202020204" pitchFamily="34" charset="0"/>
+                <a:cs typeface="Arial" panose="020B0604020202020204" pitchFamily="34" charset="0"/>
+              </a:rPr>
+              <a:t>Probability</a:t>
+            </a:r>
+            <a:endParaRPr lang="en-US" dirty="0" smtClean="0">
+              <a:latin typeface="Arial" panose="020B0604020202020204" pitchFamily="34" charset="0"/>
+              <a:cs typeface="Arial" panose="020B0604020202020204" pitchFamily="34" charset="0"/>
+            </a:endParaRPr>
+          </a:p>
+          <a:p>
+            <a:r>
+              <a:rPr lang="en-US" dirty="0" smtClean="0">
+                <a:latin typeface="Arial" panose="020B0604020202020204" pitchFamily="34" charset="0"/>
+                <a:cs typeface="Arial" panose="020B0604020202020204" pitchFamily="34" charset="0"/>
+              </a:rPr>
+              <a:t>Example:</a:t>
+            </a:r>
+          </a:p>
+          <a:p>
+            <a:pPr marL="0" indent="0">
+              <a:buNone/>
+            </a:pPr>
+            <a:r>
+              <a:rPr lang="en-US" dirty="0" smtClean="0">
+                <a:latin typeface="Arial" panose="020B0604020202020204" pitchFamily="34" charset="0"/>
+                <a:cs typeface="Arial" panose="020B0604020202020204" pitchFamily="34" charset="0"/>
+              </a:rPr>
+              <a:t>main=S(20,20,20</a:t>
+            </a:r>
+            <a:r>
+              <a:rPr lang="en-US" dirty="0">
+                <a:latin typeface="Arial" panose="020B0604020202020204" pitchFamily="34" charset="0"/>
+                <a:cs typeface="Arial" panose="020B0604020202020204" pitchFamily="34" charset="0"/>
+              </a:rPr>
+              <a:t>) </a:t>
+            </a:r>
+            <a:r>
+              <a:rPr lang="en-US" dirty="0" err="1">
+                <a:latin typeface="Arial" panose="020B0604020202020204" pitchFamily="34" charset="0"/>
+                <a:cs typeface="Arial" panose="020B0604020202020204" pitchFamily="34" charset="0"/>
+              </a:rPr>
+              <a:t>Subdiv</a:t>
+            </a:r>
+            <a:r>
+              <a:rPr lang="en-US" dirty="0">
+                <a:latin typeface="Arial" panose="020B0604020202020204" pitchFamily="34" charset="0"/>
+                <a:cs typeface="Arial" panose="020B0604020202020204" pitchFamily="34" charset="0"/>
+              </a:rPr>
+              <a:t>(0,20){house</a:t>
+            </a:r>
+            <a:r>
+              <a:rPr lang="en-US" dirty="0" smtClean="0">
+                <a:latin typeface="Arial" panose="020B0604020202020204" pitchFamily="34" charset="0"/>
+                <a:cs typeface="Arial" panose="020B0604020202020204" pitchFamily="34" charset="0"/>
+              </a:rPr>
+              <a:t>} </a:t>
+            </a:r>
+          </a:p>
+          <a:p>
+            <a:pPr marL="0" indent="0">
+              <a:buNone/>
+            </a:pPr>
+            <a:r>
+              <a:rPr lang="en-US" dirty="0">
+                <a:latin typeface="Arial" panose="020B0604020202020204" pitchFamily="34" charset="0"/>
+                <a:cs typeface="Arial" panose="020B0604020202020204" pitchFamily="34" charset="0"/>
+              </a:rPr>
+              <a:t>wall1=</a:t>
+            </a:r>
+            <a:r>
+              <a:rPr lang="en-US" dirty="0" err="1">
+                <a:latin typeface="Arial" panose="020B0604020202020204" pitchFamily="34" charset="0"/>
+                <a:cs typeface="Arial" panose="020B0604020202020204" pitchFamily="34" charset="0"/>
+              </a:rPr>
+              <a:t>Subdiv</a:t>
+            </a:r>
+            <a:r>
+              <a:rPr lang="en-US" dirty="0">
+                <a:latin typeface="Arial" panose="020B0604020202020204" pitchFamily="34" charset="0"/>
+                <a:cs typeface="Arial" panose="020B0604020202020204" pitchFamily="34" charset="0"/>
+              </a:rPr>
+              <a:t>(1,5,10,5){wallpaper,wallMiddle1,wallpaper}:0.6</a:t>
+            </a:r>
+          </a:p>
+          <a:p>
+            <a:pPr marL="0" indent="0">
+              <a:buNone/>
+            </a:pPr>
+            <a:r>
+              <a:rPr lang="en-US" dirty="0">
+                <a:latin typeface="Arial" panose="020B0604020202020204" pitchFamily="34" charset="0"/>
+                <a:cs typeface="Arial" panose="020B0604020202020204" pitchFamily="34" charset="0"/>
+              </a:rPr>
+              <a:t>wall1=</a:t>
+            </a:r>
+            <a:r>
+              <a:rPr lang="en-US" dirty="0" err="1">
+                <a:latin typeface="Arial" panose="020B0604020202020204" pitchFamily="34" charset="0"/>
+                <a:cs typeface="Arial" panose="020B0604020202020204" pitchFamily="34" charset="0"/>
+              </a:rPr>
+              <a:t>Subdiv</a:t>
+            </a:r>
+            <a:r>
+              <a:rPr lang="en-US" dirty="0">
+                <a:latin typeface="Arial" panose="020B0604020202020204" pitchFamily="34" charset="0"/>
+                <a:cs typeface="Arial" panose="020B0604020202020204" pitchFamily="34" charset="0"/>
+              </a:rPr>
+              <a:t>(1,20){wallpaper}:</a:t>
+            </a:r>
+            <a:r>
+              <a:rPr lang="en-US" dirty="0" smtClean="0">
+                <a:latin typeface="Arial" panose="020B0604020202020204" pitchFamily="34" charset="0"/>
+                <a:cs typeface="Arial" panose="020B0604020202020204" pitchFamily="34" charset="0"/>
+              </a:rPr>
+              <a:t>0.4</a:t>
+            </a:r>
+          </a:p>
+          <a:p>
+            <a:r>
+              <a:rPr lang="en-US" dirty="0" smtClean="0">
+                <a:latin typeface="Arial" panose="020B0604020202020204" pitchFamily="34" charset="0"/>
+                <a:cs typeface="Arial" panose="020B0604020202020204" pitchFamily="34" charset="0"/>
+              </a:rPr>
+              <a:t>The file can have comments using at the beginning #</a:t>
+            </a:r>
+            <a:endParaRPr lang="en-US" dirty="0">
+              <a:latin typeface="Arial" panose="020B0604020202020204" pitchFamily="34" charset="0"/>
+              <a:cs typeface="Arial" panose="020B0604020202020204" pitchFamily="34" charset="0"/>
+            </a:endParaRPr>
+          </a:p>
+        </p:txBody>
+      </p:sp>
+    </p:spTree>
+    <p:extLst>
+      <p:ext uri="{BB962C8B-B14F-4D97-AF65-F5344CB8AC3E}">
+        <p14:creationId xmlns:p14="http://schemas.microsoft.com/office/powerpoint/2010/main" val="407787763"/>
+      </p:ext>
+    </p:extLst>
+  </p:cSld>
+  <p:clrMapOvr>
+    <a:masterClrMapping/>
+  </p:clrMapOvr>
+  <p:timing>
+    <p:tnLst>
+      <p:par>
+        <p:cTn id="1" dur="indefinite" restart="never" nodeType="tmRoot"/>
+      </p:par>
+    </p:tnLst>
+  </p:timing>
+</p:sld>
+</file>
+
+<file path=ppt/slides/slide4.xml><?xml version="1.0" encoding="utf-8"?>
+<p:sld xmlns:a="http://schemas.openxmlformats.org/drawingml/2006/main" xmlns:r="http://schemas.openxmlformats.org/officeDocument/2006/relationships" xmlns:p="http://schemas.openxmlformats.org/presentationml/2006/main">
+  <p:cSld>
+    <p:spTree>
+      <p:nvGrpSpPr>
+        <p:cNvPr id="1" name=""/>
+        <p:cNvGrpSpPr/>
+        <p:nvPr/>
+      </p:nvGrpSpPr>
+      <p:grpSpPr>
+        <a:xfrm>
+          <a:off x="0" y="0"/>
+          <a:ext cx="0" cy="0"/>
+          <a:chOff x="0" y="0"/>
+          <a:chExt cx="0" cy="0"/>
+        </a:xfrm>
+      </p:grpSpPr>
+      <p:sp>
+        <p:nvSpPr>
+          <p:cNvPr id="2" name="Title 1"/>
+          <p:cNvSpPr>
+            <a:spLocks noGrp="1"/>
+          </p:cNvSpPr>
+          <p:nvPr>
+            <p:ph type="title"/>
+          </p:nvPr>
+        </p:nvSpPr>
+        <p:spPr/>
+        <p:txBody>
+          <a:bodyPr/>
+          <a:lstStyle/>
+          <a:p>
+            <a:r>
+              <a:rPr lang="en-US" b="1" dirty="0"/>
+              <a:t>Procedural Grammar for Describing a Room</a:t>
+            </a:r>
+            <a:endParaRPr lang="en-US" dirty="0"/>
+          </a:p>
+        </p:txBody>
+      </p:sp>
+      <p:sp>
+        <p:nvSpPr>
+          <p:cNvPr id="3" name="Content Placeholder 2"/>
+          <p:cNvSpPr>
+            <a:spLocks noGrp="1"/>
+          </p:cNvSpPr>
+          <p:nvPr>
+            <p:ph idx="1"/>
+          </p:nvPr>
+        </p:nvSpPr>
+        <p:spPr>
+          <a:xfrm>
+            <a:off x="1484311" y="2348246"/>
+            <a:ext cx="10018713" cy="3769218"/>
+          </a:xfrm>
+        </p:spPr>
+        <p:txBody>
+          <a:bodyPr>
+            <a:normAutofit fontScale="85000" lnSpcReduction="20000"/>
+          </a:bodyPr>
+          <a:lstStyle/>
+          <a:p>
+            <a:r>
+              <a:rPr lang="en-US" dirty="0" smtClean="0">
+                <a:latin typeface="Arial" panose="020B0604020202020204" pitchFamily="34" charset="0"/>
+                <a:cs typeface="Arial" panose="020B0604020202020204" pitchFamily="34" charset="0"/>
+              </a:rPr>
+              <a:t>There are different operators that can be use: </a:t>
+            </a:r>
+          </a:p>
+          <a:p>
+            <a:r>
+              <a:rPr lang="en-US" b="1" dirty="0" smtClean="0">
+                <a:latin typeface="Arial" panose="020B0604020202020204" pitchFamily="34" charset="0"/>
+                <a:cs typeface="Arial" panose="020B0604020202020204" pitchFamily="34" charset="0"/>
+              </a:rPr>
+              <a:t>T(X,Y,Z) </a:t>
+            </a:r>
+            <a:r>
+              <a:rPr lang="en-US" dirty="0">
+                <a:latin typeface="Arial" panose="020B0604020202020204" pitchFamily="34" charset="0"/>
+                <a:cs typeface="Arial" panose="020B0604020202020204" pitchFamily="34" charset="0"/>
+              </a:rPr>
+              <a:t>: </a:t>
+            </a:r>
+            <a:r>
+              <a:rPr lang="en-US" dirty="0" smtClean="0">
+                <a:latin typeface="Arial" panose="020B0604020202020204" pitchFamily="34" charset="0"/>
+                <a:cs typeface="Arial" panose="020B0604020202020204" pitchFamily="34" charset="0"/>
+              </a:rPr>
+              <a:t>Translation of an object</a:t>
+            </a:r>
+          </a:p>
+          <a:p>
+            <a:r>
+              <a:rPr lang="en-US" b="1" dirty="0" smtClean="0">
+                <a:latin typeface="Arial" panose="020B0604020202020204" pitchFamily="34" charset="0"/>
+                <a:cs typeface="Arial" panose="020B0604020202020204" pitchFamily="34" charset="0"/>
+              </a:rPr>
+              <a:t>Comp(type){parameters} </a:t>
+            </a:r>
+            <a:r>
+              <a:rPr lang="en-US" dirty="0">
+                <a:latin typeface="Arial" panose="020B0604020202020204" pitchFamily="34" charset="0"/>
+                <a:cs typeface="Arial" panose="020B0604020202020204" pitchFamily="34" charset="0"/>
+              </a:rPr>
+              <a:t>: Split scope into plains</a:t>
+            </a:r>
+            <a:endParaRPr lang="en-US" dirty="0" smtClean="0">
+              <a:latin typeface="Arial" panose="020B0604020202020204" pitchFamily="34" charset="0"/>
+              <a:cs typeface="Arial" panose="020B0604020202020204" pitchFamily="34" charset="0"/>
+            </a:endParaRPr>
+          </a:p>
+          <a:p>
+            <a:r>
+              <a:rPr lang="en-US" b="1" dirty="0" err="1" smtClean="0">
+                <a:latin typeface="Arial" panose="020B0604020202020204" pitchFamily="34" charset="0"/>
+                <a:cs typeface="Arial" panose="020B0604020202020204" pitchFamily="34" charset="0"/>
+              </a:rPr>
+              <a:t>Subdiv</a:t>
+            </a:r>
+            <a:r>
+              <a:rPr lang="en-US" b="1" dirty="0" smtClean="0">
+                <a:latin typeface="Arial" panose="020B0604020202020204" pitchFamily="34" charset="0"/>
+                <a:cs typeface="Arial" panose="020B0604020202020204" pitchFamily="34" charset="0"/>
+              </a:rPr>
+              <a:t>(</a:t>
+            </a:r>
+            <a:r>
+              <a:rPr lang="en-US" b="1" dirty="0" err="1" smtClean="0">
+                <a:latin typeface="Arial" panose="020B0604020202020204" pitchFamily="34" charset="0"/>
+                <a:cs typeface="Arial" panose="020B0604020202020204" pitchFamily="34" charset="0"/>
+              </a:rPr>
+              <a:t>axis,arguments</a:t>
+            </a:r>
+            <a:r>
+              <a:rPr lang="en-US" b="1" dirty="0" smtClean="0">
+                <a:latin typeface="Arial" panose="020B0604020202020204" pitchFamily="34" charset="0"/>
+                <a:cs typeface="Arial" panose="020B0604020202020204" pitchFamily="34" charset="0"/>
+              </a:rPr>
+              <a:t>){parameters} </a:t>
+            </a:r>
+            <a:r>
+              <a:rPr lang="en-US" dirty="0">
+                <a:latin typeface="Arial" panose="020B0604020202020204" pitchFamily="34" charset="0"/>
+                <a:cs typeface="Arial" panose="020B0604020202020204" pitchFamily="34" charset="0"/>
+              </a:rPr>
+              <a:t>: Divide scope in smaller scopes (children</a:t>
+            </a:r>
+            <a:r>
+              <a:rPr lang="en-US" dirty="0" smtClean="0">
+                <a:latin typeface="Arial" panose="020B0604020202020204" pitchFamily="34" charset="0"/>
+                <a:cs typeface="Arial" panose="020B0604020202020204" pitchFamily="34" charset="0"/>
+              </a:rPr>
+              <a:t>)</a:t>
+            </a:r>
+          </a:p>
+          <a:p>
+            <a:r>
+              <a:rPr lang="en-US" b="1" dirty="0" smtClean="0">
+                <a:latin typeface="Arial" panose="020B0604020202020204" pitchFamily="34" charset="0"/>
+                <a:cs typeface="Arial" panose="020B0604020202020204" pitchFamily="34" charset="0"/>
+              </a:rPr>
+              <a:t>I(</a:t>
+            </a:r>
+            <a:r>
+              <a:rPr lang="en-US" b="1" dirty="0" err="1" smtClean="0">
+                <a:latin typeface="Arial" panose="020B0604020202020204" pitchFamily="34" charset="0"/>
+                <a:cs typeface="Arial" panose="020B0604020202020204" pitchFamily="34" charset="0"/>
+              </a:rPr>
+              <a:t>typeObject</a:t>
+            </a:r>
+            <a:r>
+              <a:rPr lang="en-US" b="1" dirty="0">
+                <a:latin typeface="Arial" panose="020B0604020202020204" pitchFamily="34" charset="0"/>
+                <a:cs typeface="Arial" panose="020B0604020202020204" pitchFamily="34" charset="0"/>
+              </a:rPr>
+              <a:t>){texture} </a:t>
+            </a:r>
+            <a:r>
+              <a:rPr lang="en-US" dirty="0">
+                <a:latin typeface="Arial" panose="020B0604020202020204" pitchFamily="34" charset="0"/>
+                <a:cs typeface="Arial" panose="020B0604020202020204" pitchFamily="34" charset="0"/>
+              </a:rPr>
+              <a:t>:  Instance of a </a:t>
+            </a:r>
+            <a:r>
+              <a:rPr lang="en-US" dirty="0" smtClean="0">
+                <a:latin typeface="Arial" panose="020B0604020202020204" pitchFamily="34" charset="0"/>
+                <a:cs typeface="Arial" panose="020B0604020202020204" pitchFamily="34" charset="0"/>
+              </a:rPr>
+              <a:t>figure</a:t>
+            </a:r>
+          </a:p>
+          <a:p>
+            <a:r>
+              <a:rPr lang="en-US" b="1" dirty="0">
+                <a:latin typeface="Arial" panose="020B0604020202020204" pitchFamily="34" charset="0"/>
+                <a:cs typeface="Arial" panose="020B0604020202020204" pitchFamily="34" charset="0"/>
+              </a:rPr>
+              <a:t>S(X,Y,Z)</a:t>
+            </a:r>
+            <a:r>
+              <a:rPr lang="en-US" dirty="0">
+                <a:latin typeface="Arial" panose="020B0604020202020204" pitchFamily="34" charset="0"/>
+                <a:cs typeface="Arial" panose="020B0604020202020204" pitchFamily="34" charset="0"/>
+              </a:rPr>
+              <a:t> : Set new </a:t>
+            </a:r>
+            <a:r>
+              <a:rPr lang="en-US" dirty="0" smtClean="0">
+                <a:latin typeface="Arial" panose="020B0604020202020204" pitchFamily="34" charset="0"/>
+                <a:cs typeface="Arial" panose="020B0604020202020204" pitchFamily="34" charset="0"/>
+              </a:rPr>
+              <a:t>size</a:t>
+            </a:r>
+          </a:p>
+          <a:p>
+            <a:r>
+              <a:rPr lang="en-US" b="1" dirty="0" smtClean="0">
+                <a:latin typeface="Arial" panose="020B0604020202020204" pitchFamily="34" charset="0"/>
+                <a:cs typeface="Arial" panose="020B0604020202020204" pitchFamily="34" charset="0"/>
+              </a:rPr>
+              <a:t>S3d(</a:t>
+            </a:r>
+            <a:r>
+              <a:rPr lang="en-US" b="1" dirty="0" err="1" smtClean="0">
+                <a:latin typeface="Arial" panose="020B0604020202020204" pitchFamily="34" charset="0"/>
+                <a:cs typeface="Arial" panose="020B0604020202020204" pitchFamily="34" charset="0"/>
+              </a:rPr>
+              <a:t>axis,size</a:t>
+            </a:r>
+            <a:r>
+              <a:rPr lang="en-US" b="1" dirty="0">
+                <a:latin typeface="Arial" panose="020B0604020202020204" pitchFamily="34" charset="0"/>
+                <a:cs typeface="Arial" panose="020B0604020202020204" pitchFamily="34" charset="0"/>
+              </a:rPr>
+              <a:t>)</a:t>
+            </a:r>
+            <a:r>
+              <a:rPr lang="en-US" dirty="0">
+                <a:latin typeface="Arial" panose="020B0604020202020204" pitchFamily="34" charset="0"/>
+                <a:cs typeface="Arial" panose="020B0604020202020204" pitchFamily="34" charset="0"/>
+              </a:rPr>
+              <a:t> : Set new size for an specific </a:t>
+            </a:r>
+            <a:r>
+              <a:rPr lang="en-US" dirty="0" smtClean="0">
+                <a:latin typeface="Arial" panose="020B0604020202020204" pitchFamily="34" charset="0"/>
+                <a:cs typeface="Arial" panose="020B0604020202020204" pitchFamily="34" charset="0"/>
+              </a:rPr>
+              <a:t>axis</a:t>
+            </a:r>
+          </a:p>
+          <a:p>
+            <a:r>
+              <a:rPr lang="en-US" b="1" dirty="0" smtClean="0">
+                <a:latin typeface="Arial" panose="020B0604020202020204" pitchFamily="34" charset="0"/>
+                <a:cs typeface="Arial" panose="020B0604020202020204" pitchFamily="34" charset="0"/>
+              </a:rPr>
+              <a:t>R(</a:t>
+            </a:r>
+            <a:r>
+              <a:rPr lang="en-US" b="1" dirty="0" err="1" smtClean="0">
+                <a:latin typeface="Arial" panose="020B0604020202020204" pitchFamily="34" charset="0"/>
+                <a:cs typeface="Arial" panose="020B0604020202020204" pitchFamily="34" charset="0"/>
+              </a:rPr>
+              <a:t>angleX,angley,angleZ</a:t>
+            </a:r>
+            <a:r>
+              <a:rPr lang="en-US" b="1" dirty="0">
+                <a:latin typeface="Arial" panose="020B0604020202020204" pitchFamily="34" charset="0"/>
+                <a:cs typeface="Arial" panose="020B0604020202020204" pitchFamily="34" charset="0"/>
+              </a:rPr>
+              <a:t>) </a:t>
+            </a:r>
+            <a:r>
+              <a:rPr lang="en-US" dirty="0">
+                <a:latin typeface="Arial" panose="020B0604020202020204" pitchFamily="34" charset="0"/>
+                <a:cs typeface="Arial" panose="020B0604020202020204" pitchFamily="34" charset="0"/>
+              </a:rPr>
+              <a:t>: Rotating around axis </a:t>
+            </a:r>
+            <a:endParaRPr lang="en-US" dirty="0" smtClean="0">
+              <a:latin typeface="Arial" panose="020B0604020202020204" pitchFamily="34" charset="0"/>
+              <a:cs typeface="Arial" panose="020B0604020202020204" pitchFamily="34" charset="0"/>
+            </a:endParaRPr>
+          </a:p>
+          <a:p>
+            <a:pPr marL="0" indent="0">
+              <a:buNone/>
+            </a:pPr>
+            <a:endParaRPr lang="en-US" dirty="0">
+              <a:latin typeface="Arial" panose="020B0604020202020204" pitchFamily="34" charset="0"/>
+              <a:cs typeface="Arial" panose="020B0604020202020204" pitchFamily="34" charset="0"/>
+            </a:endParaRPr>
+          </a:p>
+          <a:p>
+            <a:pPr marL="0" indent="0">
+              <a:buNone/>
+            </a:pPr>
+            <a:r>
+              <a:rPr lang="en-US" dirty="0" smtClean="0">
+                <a:latin typeface="Arial" panose="020B0604020202020204" pitchFamily="34" charset="0"/>
+                <a:cs typeface="Arial" panose="020B0604020202020204" pitchFamily="34" charset="0"/>
+              </a:rPr>
+              <a:t>Axis are X=0, Y=1, Z=2</a:t>
+            </a:r>
+            <a:endParaRPr lang="en-US" dirty="0">
+              <a:latin typeface="Arial" panose="020B0604020202020204" pitchFamily="34" charset="0"/>
+              <a:cs typeface="Arial" panose="020B0604020202020204" pitchFamily="34" charset="0"/>
+            </a:endParaRPr>
+          </a:p>
+        </p:txBody>
+      </p:sp>
+      <p:sp>
+        <p:nvSpPr>
+          <p:cNvPr id="4" name="TextBox 3"/>
+          <p:cNvSpPr txBox="1"/>
+          <p:nvPr/>
+        </p:nvSpPr>
+        <p:spPr>
+          <a:xfrm>
+            <a:off x="2575775" y="6334780"/>
+            <a:ext cx="9616225" cy="523220"/>
+          </a:xfrm>
+          <a:prstGeom prst="rect">
+            <a:avLst/>
+          </a:prstGeom>
+          <a:noFill/>
+        </p:spPr>
+        <p:txBody>
+          <a:bodyPr wrap="square" rtlCol="0">
+            <a:spAutoFit/>
+          </a:bodyPr>
+          <a:lstStyle/>
+          <a:p>
+            <a:r>
+              <a:rPr lang="en-US" sz="1400" dirty="0" smtClean="0">
+                <a:latin typeface="Arial" panose="020B0604020202020204" pitchFamily="34" charset="0"/>
+                <a:cs typeface="Arial" panose="020B0604020202020204" pitchFamily="34" charset="0"/>
+              </a:rPr>
+              <a:t>Taken:</a:t>
+            </a:r>
+          </a:p>
+          <a:p>
+            <a:r>
+              <a:rPr lang="en-US" sz="1400" dirty="0" smtClean="0">
+                <a:latin typeface="Arial" panose="020B0604020202020204" pitchFamily="34" charset="0"/>
+                <a:cs typeface="Arial" panose="020B0604020202020204" pitchFamily="34" charset="0"/>
+              </a:rPr>
+              <a:t>P. Muller, G. Zeng, P. Wonka, and L. Van </a:t>
+            </a:r>
+            <a:r>
+              <a:rPr lang="en-US" sz="1400" dirty="0" err="1" smtClean="0">
+                <a:latin typeface="Arial" panose="020B0604020202020204" pitchFamily="34" charset="0"/>
+                <a:cs typeface="Arial" panose="020B0604020202020204" pitchFamily="34" charset="0"/>
+              </a:rPr>
+              <a:t>Gool</a:t>
+            </a:r>
+            <a:r>
+              <a:rPr lang="en-US" sz="1400" dirty="0" smtClean="0">
+                <a:latin typeface="Arial" panose="020B0604020202020204" pitchFamily="34" charset="0"/>
+                <a:cs typeface="Arial" panose="020B0604020202020204" pitchFamily="34" charset="0"/>
+              </a:rPr>
+              <a:t>. Image-based ¨ procedural modeling of facades. In SIGGRAPH, 2007</a:t>
+            </a:r>
+            <a:endParaRPr lang="en-US" sz="1400" dirty="0">
+              <a:latin typeface="Arial" panose="020B0604020202020204" pitchFamily="34" charset="0"/>
+              <a:cs typeface="Arial" panose="020B0604020202020204" pitchFamily="34" charset="0"/>
+            </a:endParaRPr>
+          </a:p>
+        </p:txBody>
+      </p:sp>
+    </p:spTree>
+    <p:extLst>
+      <p:ext uri="{BB962C8B-B14F-4D97-AF65-F5344CB8AC3E}">
+        <p14:creationId xmlns:p14="http://schemas.microsoft.com/office/powerpoint/2010/main" val="2400364527"/>
+      </p:ext>
+    </p:extLst>
+  </p:cSld>
+  <p:clrMapOvr>
+    <a:masterClrMapping/>
+  </p:clrMapOvr>
+  <p:timing>
+    <p:tnLst>
+      <p:par>
+        <p:cTn id="1" dur="indefinite" restart="never" nodeType="tmRoot"/>
+      </p:par>
+    </p:tnLst>
+  </p:timing>
+</p:sld>
+</file>
+
+<file path=ppt/slides/slide5.xml><?xml version="1.0" encoding="utf-8"?>
+<p:sld xmlns:a="http://schemas.openxmlformats.org/drawingml/2006/main" xmlns:r="http://schemas.openxmlformats.org/officeDocument/2006/relationships" xmlns:p="http://schemas.openxmlformats.org/presentationml/2006/main">
+  <p:cSld>
+    <p:spTree>
+      <p:nvGrpSpPr>
+        <p:cNvPr id="1" name=""/>
+        <p:cNvGrpSpPr/>
+        <p:nvPr/>
+      </p:nvGrpSpPr>
+      <p:grpSpPr>
+        <a:xfrm>
+          <a:off x="0" y="0"/>
+          <a:ext cx="0" cy="0"/>
+          <a:chOff x="0" y="0"/>
+          <a:chExt cx="0" cy="0"/>
+        </a:xfrm>
+      </p:grpSpPr>
+      <p:sp>
+        <p:nvSpPr>
+          <p:cNvPr id="2" name="Title 1"/>
+          <p:cNvSpPr>
+            <a:spLocks noGrp="1"/>
+          </p:cNvSpPr>
+          <p:nvPr>
+            <p:ph type="title"/>
+          </p:nvPr>
+        </p:nvSpPr>
+        <p:spPr/>
+        <p:txBody>
+          <a:bodyPr/>
+          <a:lstStyle/>
+          <a:p>
+            <a:r>
+              <a:rPr lang="en-US" b="1" dirty="0"/>
+              <a:t>Procedural Grammar for Describing a Room</a:t>
+            </a:r>
+            <a:endParaRPr lang="en-US" dirty="0"/>
+          </a:p>
+        </p:txBody>
+      </p:sp>
+      <p:sp>
+        <p:nvSpPr>
+          <p:cNvPr id="3" name="Content Placeholder 2"/>
+          <p:cNvSpPr>
+            <a:spLocks noGrp="1"/>
+          </p:cNvSpPr>
+          <p:nvPr>
+            <p:ph idx="1"/>
+          </p:nvPr>
+        </p:nvSpPr>
+        <p:spPr/>
+        <p:txBody>
+          <a:bodyPr/>
+          <a:lstStyle/>
+          <a:p>
+            <a:r>
+              <a:rPr lang="en-US" dirty="0" smtClean="0">
+                <a:latin typeface="Arial" panose="020B0604020202020204" pitchFamily="34" charset="0"/>
+                <a:cs typeface="Arial" panose="020B0604020202020204" pitchFamily="34" charset="0"/>
+              </a:rPr>
+              <a:t>There are different </a:t>
+            </a:r>
+            <a:r>
+              <a:rPr lang="en-US" dirty="0" err="1" smtClean="0">
+                <a:latin typeface="Arial" panose="020B0604020202020204" pitchFamily="34" charset="0"/>
+                <a:cs typeface="Arial" panose="020B0604020202020204" pitchFamily="34" charset="0"/>
+              </a:rPr>
+              <a:t>typeObjects</a:t>
+            </a:r>
+            <a:r>
+              <a:rPr lang="en-US" dirty="0" smtClean="0">
+                <a:latin typeface="Arial" panose="020B0604020202020204" pitchFamily="34" charset="0"/>
+                <a:cs typeface="Arial" panose="020B0604020202020204" pitchFamily="34" charset="0"/>
+              </a:rPr>
+              <a:t>:</a:t>
+            </a:r>
+          </a:p>
+          <a:p>
+            <a:r>
+              <a:rPr lang="en-US" dirty="0" err="1">
+                <a:latin typeface="Arial" panose="020B0604020202020204" pitchFamily="34" charset="0"/>
+                <a:cs typeface="Arial" panose="020B0604020202020204" pitchFamily="34" charset="0"/>
+              </a:rPr>
+              <a:t>enum</a:t>
+            </a:r>
+            <a:r>
+              <a:rPr lang="en-US" dirty="0">
+                <a:latin typeface="Arial" panose="020B0604020202020204" pitchFamily="34" charset="0"/>
+                <a:cs typeface="Arial" panose="020B0604020202020204" pitchFamily="34" charset="0"/>
+              </a:rPr>
+              <a:t> </a:t>
+            </a:r>
+            <a:r>
+              <a:rPr lang="en-US" dirty="0" err="1">
+                <a:latin typeface="Arial" panose="020B0604020202020204" pitchFamily="34" charset="0"/>
+                <a:cs typeface="Arial" panose="020B0604020202020204" pitchFamily="34" charset="0"/>
+              </a:rPr>
+              <a:t>TypeObject</a:t>
+            </a:r>
+            <a:r>
+              <a:rPr lang="en-US" dirty="0">
+                <a:latin typeface="Arial" panose="020B0604020202020204" pitchFamily="34" charset="0"/>
+                <a:cs typeface="Arial" panose="020B0604020202020204" pitchFamily="34" charset="0"/>
+              </a:rPr>
+              <a:t> { INACTIVE, SCOPE, PLAIN, CUBE, CYLINDER, SOFA, TABLE, CABINET, CHAIR, TOY };</a:t>
+            </a:r>
+          </a:p>
+        </p:txBody>
+      </p:sp>
+    </p:spTree>
+    <p:extLst>
+      <p:ext uri="{BB962C8B-B14F-4D97-AF65-F5344CB8AC3E}">
+        <p14:creationId xmlns:p14="http://schemas.microsoft.com/office/powerpoint/2010/main" val="1606075839"/>
+      </p:ext>
+    </p:extLst>
+  </p:cSld>
+  <p:clrMapOvr>
+    <a:masterClrMapping/>
+  </p:clrMapOvr>
+  <p:timing>
+    <p:tnLst>
+      <p:par>
+        <p:cTn id="1" dur="indefinite" restart="never" nodeType="tmRoot"/>
+      </p:par>
+    </p:tnLst>
+  </p:timing>
+</p:sld>
+</file>
+
+<file path=ppt/slides/slide6.xml><?xml version="1.0" encoding="utf-8"?>
+<p:sld xmlns:a="http://schemas.openxmlformats.org/drawingml/2006/main" xmlns:r="http://schemas.openxmlformats.org/officeDocument/2006/relationships" xmlns:p="http://schemas.openxmlformats.org/presentationml/2006/main">
+  <p:cSld>
+    <p:spTree>
+      <p:nvGrpSpPr>
+        <p:cNvPr id="1" name=""/>
+        <p:cNvGrpSpPr/>
+        <p:nvPr/>
+      </p:nvGrpSpPr>
+      <p:grpSpPr>
+        <a:xfrm>
+          <a:off x="0" y="0"/>
+          <a:ext cx="0" cy="0"/>
+          <a:chOff x="0" y="0"/>
+          <a:chExt cx="0" cy="0"/>
+        </a:xfrm>
+      </p:grpSpPr>
+      <p:sp>
+        <p:nvSpPr>
+          <p:cNvPr id="2" name="Title 1"/>
+          <p:cNvSpPr>
+            <a:spLocks noGrp="1"/>
+          </p:cNvSpPr>
+          <p:nvPr>
+            <p:ph type="title"/>
+          </p:nvPr>
+        </p:nvSpPr>
+        <p:spPr>
+          <a:xfrm>
+            <a:off x="1484311" y="685801"/>
+            <a:ext cx="10018713" cy="887506"/>
+          </a:xfrm>
+        </p:spPr>
+        <p:txBody>
+          <a:bodyPr/>
+          <a:lstStyle/>
+          <a:p>
+            <a:r>
+              <a:rPr lang="en-US" b="1" dirty="0" smtClean="0"/>
+              <a:t>Oriented Object Model</a:t>
+            </a:r>
+            <a:endParaRPr lang="en-US" b="1" dirty="0"/>
+          </a:p>
+        </p:txBody>
+      </p:sp>
+      <p:pic>
+        <p:nvPicPr>
+          <p:cNvPr id="4" name="Content Placeholder 3"/>
+          <p:cNvPicPr>
+            <a:picLocks noGrp="1" noChangeAspect="1"/>
+          </p:cNvPicPr>
+          <p:nvPr>
+            <p:ph idx="1"/>
+          </p:nvPr>
+        </p:nvPicPr>
+        <p:blipFill>
+          <a:blip r:embed="rId2">
+            <a:extLst>
+              <a:ext uri="{28A0092B-C50C-407E-A947-70E740481C1C}">
+                <a14:useLocalDpi xmlns:a14="http://schemas.microsoft.com/office/drawing/2010/main" val="0"/>
+              </a:ext>
+            </a:extLst>
+          </a:blip>
+          <a:stretch>
+            <a:fillRect/>
+          </a:stretch>
+        </p:blipFill>
+        <p:spPr>
+          <a:xfrm>
+            <a:off x="2837329" y="1506617"/>
+            <a:ext cx="7027888" cy="5210466"/>
+          </a:xfrm>
+        </p:spPr>
+      </p:pic>
+    </p:spTree>
+    <p:extLst>
+      <p:ext uri="{BB962C8B-B14F-4D97-AF65-F5344CB8AC3E}">
+        <p14:creationId xmlns:p14="http://schemas.microsoft.com/office/powerpoint/2010/main" val="3684367063"/>
+      </p:ext>
+    </p:extLst>
+  </p:cSld>
+  <p:clrMapOvr>
+    <a:masterClrMapping/>
+  </p:clrMapOvr>
+  <p:timing>
+    <p:tnLst>
+      <p:par>
+        <p:cTn id="1" dur="indefinite" restart="never" nodeType="tmRoot"/>
+      </p:par>
+    </p:tnLst>
+  </p:timing>
+</p:sld>
+</file>
+
+<file path=ppt/slides/slide7.xml><?xml version="1.0" encoding="utf-8"?>
+<p:sld xmlns:a="http://schemas.openxmlformats.org/drawingml/2006/main" xmlns:r="http://schemas.openxmlformats.org/officeDocument/2006/relationships" xmlns:p="http://schemas.openxmlformats.org/presentationml/2006/main">
+  <p:cSld>
+    <p:spTree>
+      <p:nvGrpSpPr>
+        <p:cNvPr id="1" name=""/>
+        <p:cNvGrpSpPr/>
+        <p:nvPr/>
+      </p:nvGrpSpPr>
+      <p:grpSpPr>
+        <a:xfrm>
+          <a:off x="0" y="0"/>
+          <a:ext cx="0" cy="0"/>
+          <a:chOff x="0" y="0"/>
+          <a:chExt cx="0" cy="0"/>
+        </a:xfrm>
+      </p:grpSpPr>
+      <p:sp>
+        <p:nvSpPr>
+          <p:cNvPr id="2" name="Title 1"/>
+          <p:cNvSpPr>
+            <a:spLocks noGrp="1"/>
+          </p:cNvSpPr>
+          <p:nvPr>
+            <p:ph type="title"/>
+          </p:nvPr>
+        </p:nvSpPr>
+        <p:spPr/>
+        <p:txBody>
+          <a:bodyPr/>
+          <a:lstStyle/>
+          <a:p>
+            <a:r>
+              <a:rPr lang="en-US" b="1" dirty="0" smtClean="0"/>
+              <a:t>Parsing the File</a:t>
+            </a:r>
+            <a:endParaRPr lang="en-US" b="1" dirty="0"/>
+          </a:p>
+        </p:txBody>
+      </p:sp>
+      <p:sp>
+        <p:nvSpPr>
+          <p:cNvPr id="3" name="Content Placeholder 2"/>
+          <p:cNvSpPr>
+            <a:spLocks noGrp="1"/>
+          </p:cNvSpPr>
+          <p:nvPr>
+            <p:ph idx="1"/>
+          </p:nvPr>
+        </p:nvSpPr>
+        <p:spPr/>
+        <p:txBody>
+          <a:bodyPr>
+            <a:normAutofit fontScale="77500" lnSpcReduction="20000"/>
+          </a:bodyPr>
+          <a:lstStyle/>
+          <a:p>
+            <a:r>
+              <a:rPr lang="en-US" dirty="0" smtClean="0">
+                <a:latin typeface="Arial" panose="020B0604020202020204" pitchFamily="34" charset="0"/>
+                <a:cs typeface="Arial" panose="020B0604020202020204" pitchFamily="34" charset="0"/>
+              </a:rPr>
+              <a:t>Steps:</a:t>
+            </a:r>
+          </a:p>
+          <a:p>
+            <a:pPr marL="457200" indent="-457200">
+              <a:buFont typeface="+mj-lt"/>
+              <a:buAutoNum type="arabicPeriod"/>
+            </a:pPr>
+            <a:r>
+              <a:rPr lang="en-US" dirty="0" smtClean="0">
+                <a:latin typeface="Arial" panose="020B0604020202020204" pitchFamily="34" charset="0"/>
+                <a:cs typeface="Arial" panose="020B0604020202020204" pitchFamily="34" charset="0"/>
+              </a:rPr>
+              <a:t>Read the file and save it in a vector&lt;string&gt;.</a:t>
+            </a:r>
+          </a:p>
+          <a:p>
+            <a:pPr marL="457200" indent="-457200">
+              <a:buFont typeface="+mj-lt"/>
+              <a:buAutoNum type="arabicPeriod"/>
+            </a:pPr>
+            <a:r>
+              <a:rPr lang="en-US" dirty="0" smtClean="0">
+                <a:latin typeface="Arial" panose="020B0604020202020204" pitchFamily="34" charset="0"/>
+                <a:cs typeface="Arial" panose="020B0604020202020204" pitchFamily="34" charset="0"/>
+              </a:rPr>
+              <a:t>Parse the vector&lt;string&gt; into a vector&lt;rule&gt;.</a:t>
+            </a:r>
+          </a:p>
+          <a:p>
+            <a:pPr marL="914400" lvl="1" indent="-457200">
+              <a:buFont typeface="+mj-lt"/>
+              <a:buAutoNum type="alphaLcPeriod"/>
+            </a:pPr>
+            <a:r>
+              <a:rPr lang="en-US" dirty="0" smtClean="0">
+                <a:latin typeface="Arial" panose="020B0604020202020204" pitchFamily="34" charset="0"/>
+                <a:cs typeface="Arial" panose="020B0604020202020204" pitchFamily="34" charset="0"/>
+              </a:rPr>
+              <a:t>Save the repeat heads in a temporal vector&lt;rule&gt;.</a:t>
+            </a:r>
+          </a:p>
+          <a:p>
+            <a:pPr marL="914400" lvl="1" indent="-457200">
+              <a:buFont typeface="+mj-lt"/>
+              <a:buAutoNum type="alphaLcPeriod"/>
+            </a:pPr>
+            <a:r>
+              <a:rPr lang="en-US" dirty="0" smtClean="0">
+                <a:latin typeface="Arial" panose="020B0604020202020204" pitchFamily="34" charset="0"/>
+                <a:cs typeface="Arial" panose="020B0604020202020204" pitchFamily="34" charset="0"/>
+              </a:rPr>
+              <a:t>Create a random between 0 and 1.</a:t>
+            </a:r>
+          </a:p>
+          <a:p>
+            <a:pPr marL="914400" lvl="1" indent="-457200">
+              <a:buFont typeface="+mj-lt"/>
+              <a:buAutoNum type="alphaLcPeriod"/>
+            </a:pPr>
+            <a:r>
+              <a:rPr lang="en-US" dirty="0" smtClean="0">
+                <a:latin typeface="Arial" panose="020B0604020202020204" pitchFamily="34" charset="0"/>
+                <a:cs typeface="Arial" panose="020B0604020202020204" pitchFamily="34" charset="0"/>
+              </a:rPr>
+              <a:t>Find the nearest probability with the random; save the winner in another vector&lt;rule&gt;.</a:t>
+            </a:r>
+          </a:p>
+          <a:p>
+            <a:pPr marL="914400" lvl="1" indent="-457200">
+              <a:buFont typeface="+mj-lt"/>
+              <a:buAutoNum type="alphaLcPeriod"/>
+            </a:pPr>
+            <a:r>
+              <a:rPr lang="en-US" dirty="0" smtClean="0">
+                <a:latin typeface="Arial" panose="020B0604020202020204" pitchFamily="34" charset="0"/>
+                <a:cs typeface="Arial" panose="020B0604020202020204" pitchFamily="34" charset="0"/>
+              </a:rPr>
+              <a:t>Erase the losers from the original vector&lt;rule&gt;.</a:t>
+            </a:r>
+          </a:p>
+          <a:p>
+            <a:pPr marL="914400" lvl="1" indent="-457200">
+              <a:buFont typeface="+mj-lt"/>
+              <a:buAutoNum type="alphaLcPeriod"/>
+            </a:pPr>
+            <a:r>
+              <a:rPr lang="en-US" dirty="0" smtClean="0">
+                <a:latin typeface="Arial" panose="020B0604020202020204" pitchFamily="34" charset="0"/>
+                <a:cs typeface="Arial" panose="020B0604020202020204" pitchFamily="34" charset="0"/>
+              </a:rPr>
+              <a:t>And repeat it until there is no more repeat heads.</a:t>
+            </a:r>
+          </a:p>
+          <a:p>
+            <a:pPr marL="457200" indent="-457200">
+              <a:buFont typeface="+mj-lt"/>
+              <a:buAutoNum type="arabicPeriod"/>
+            </a:pPr>
+            <a:r>
+              <a:rPr lang="en-US" dirty="0" smtClean="0">
+                <a:latin typeface="Arial" panose="020B0604020202020204" pitchFamily="34" charset="0"/>
+                <a:cs typeface="Arial" panose="020B0604020202020204" pitchFamily="34" charset="0"/>
+              </a:rPr>
+              <a:t>Return the vector&lt;rule&gt;</a:t>
+            </a:r>
+          </a:p>
+          <a:p>
+            <a:pPr marL="914400" lvl="1" indent="-457200">
+              <a:buFont typeface="+mj-lt"/>
+              <a:buAutoNum type="alphaLcPeriod"/>
+            </a:pPr>
+            <a:endParaRPr lang="en-US" dirty="0"/>
+          </a:p>
+        </p:txBody>
+      </p:sp>
+    </p:spTree>
+    <p:extLst>
+      <p:ext uri="{BB962C8B-B14F-4D97-AF65-F5344CB8AC3E}">
+        <p14:creationId xmlns:p14="http://schemas.microsoft.com/office/powerpoint/2010/main" val="3732905569"/>
+      </p:ext>
+    </p:extLst>
+  </p:cSld>
+  <p:clrMapOvr>
+    <a:masterClrMapping/>
+  </p:clrMapOvr>
+  <p:timing>
+    <p:tnLst>
+      <p:par>
+        <p:cTn id="1" dur="indefinite" restart="never" nodeType="tmRoot"/>
+      </p:par>
+    </p:tnLst>
+  </p:timing>
+</p:sld>
+</file>
+
+<file path=ppt/slides/slide8.xml><?xml version="1.0" encoding="utf-8"?>
+<p:sld xmlns:a="http://schemas.openxmlformats.org/drawingml/2006/main" xmlns:r="http://schemas.openxmlformats.org/officeDocument/2006/relationships" xmlns:p="http://schemas.openxmlformats.org/presentationml/2006/main">
+  <p:cSld>
+    <p:spTree>
+      <p:nvGrpSpPr>
+        <p:cNvPr id="1" name=""/>
+        <p:cNvGrpSpPr/>
+        <p:nvPr/>
+      </p:nvGrpSpPr>
+      <p:grpSpPr>
+        <a:xfrm>
+          <a:off x="0" y="0"/>
+          <a:ext cx="0" cy="0"/>
+          <a:chOff x="0" y="0"/>
+          <a:chExt cx="0" cy="0"/>
+        </a:xfrm>
+      </p:grpSpPr>
+      <p:sp>
+        <p:nvSpPr>
+          <p:cNvPr id="2" name="Title 1"/>
+          <p:cNvSpPr>
+            <a:spLocks noGrp="1"/>
+          </p:cNvSpPr>
+          <p:nvPr>
+            <p:ph type="title"/>
+          </p:nvPr>
+        </p:nvSpPr>
+        <p:spPr/>
+        <p:txBody>
+          <a:bodyPr/>
+          <a:lstStyle/>
+          <a:p>
+            <a:r>
+              <a:rPr lang="en-US" b="1" dirty="0" smtClean="0"/>
+              <a:t>Modeler: Data Structure (Tree)</a:t>
+            </a:r>
+            <a:endParaRPr lang="en-US" b="1" dirty="0"/>
+          </a:p>
+        </p:txBody>
+      </p:sp>
+      <p:sp>
+        <p:nvSpPr>
+          <p:cNvPr id="3" name="Content Placeholder 2"/>
+          <p:cNvSpPr>
+            <a:spLocks noGrp="1"/>
+          </p:cNvSpPr>
+          <p:nvPr>
+            <p:ph idx="1"/>
+          </p:nvPr>
+        </p:nvSpPr>
+        <p:spPr>
+          <a:xfrm>
+            <a:off x="1484310" y="2215166"/>
+            <a:ext cx="10018713" cy="4237150"/>
+          </a:xfrm>
+        </p:spPr>
+        <p:txBody>
+          <a:bodyPr>
+            <a:normAutofit fontScale="70000" lnSpcReduction="20000"/>
+          </a:bodyPr>
+          <a:lstStyle/>
+          <a:p>
+            <a:r>
+              <a:rPr lang="en-US" dirty="0" smtClean="0">
+                <a:latin typeface="Arial" panose="020B0604020202020204" pitchFamily="34" charset="0"/>
+                <a:cs typeface="Arial" panose="020B0604020202020204" pitchFamily="34" charset="0"/>
+              </a:rPr>
+              <a:t>Steps:</a:t>
+            </a:r>
+          </a:p>
+          <a:p>
+            <a:pPr marL="457200" indent="-457200">
+              <a:buFont typeface="+mj-lt"/>
+              <a:buAutoNum type="arabicPeriod"/>
+            </a:pPr>
+            <a:r>
+              <a:rPr lang="en-US" dirty="0" smtClean="0">
+                <a:latin typeface="Arial" panose="020B0604020202020204" pitchFamily="34" charset="0"/>
+                <a:cs typeface="Arial" panose="020B0604020202020204" pitchFamily="34" charset="0"/>
+              </a:rPr>
+              <a:t>Transform the vector&lt;rule&gt; into a map&lt;</a:t>
+            </a:r>
+            <a:r>
+              <a:rPr lang="en-US" dirty="0" err="1" smtClean="0">
+                <a:latin typeface="Arial" panose="020B0604020202020204" pitchFamily="34" charset="0"/>
+                <a:cs typeface="Arial" panose="020B0604020202020204" pitchFamily="34" charset="0"/>
+              </a:rPr>
+              <a:t>string,string</a:t>
+            </a:r>
+            <a:r>
+              <a:rPr lang="en-US" dirty="0" smtClean="0">
+                <a:latin typeface="Arial" panose="020B0604020202020204" pitchFamily="34" charset="0"/>
+                <a:cs typeface="Arial" panose="020B0604020202020204" pitchFamily="34" charset="0"/>
+              </a:rPr>
+              <a:t>&gt;</a:t>
+            </a:r>
+          </a:p>
+          <a:p>
+            <a:pPr marL="457200" indent="-457200">
+              <a:buFont typeface="+mj-lt"/>
+              <a:buAutoNum type="arabicPeriod"/>
+            </a:pPr>
+            <a:r>
+              <a:rPr lang="en-US" dirty="0" smtClean="0">
+                <a:latin typeface="Arial" panose="020B0604020202020204" pitchFamily="34" charset="0"/>
+                <a:cs typeface="Arial" panose="020B0604020202020204" pitchFamily="34" charset="0"/>
+              </a:rPr>
+              <a:t>Initialize the model (modeler* tree) and add the model in vector&lt;modeler*&gt; list (global variable)</a:t>
+            </a:r>
+          </a:p>
+          <a:p>
+            <a:pPr marL="457200" indent="-457200">
+              <a:buFont typeface="+mj-lt"/>
+              <a:buAutoNum type="arabicPeriod"/>
+            </a:pPr>
+            <a:r>
+              <a:rPr lang="en-US" dirty="0" smtClean="0">
+                <a:latin typeface="Arial" panose="020B0604020202020204" pitchFamily="34" charset="0"/>
+                <a:cs typeface="Arial" panose="020B0604020202020204" pitchFamily="34" charset="0"/>
+              </a:rPr>
+              <a:t>Copy the first model in the list in a temporal variable (modeler* </a:t>
+            </a:r>
+            <a:r>
+              <a:rPr lang="en-US" dirty="0" err="1" smtClean="0">
+                <a:latin typeface="Arial" panose="020B0604020202020204" pitchFamily="34" charset="0"/>
+                <a:cs typeface="Arial" panose="020B0604020202020204" pitchFamily="34" charset="0"/>
+              </a:rPr>
+              <a:t>currentModel</a:t>
+            </a:r>
+            <a:r>
+              <a:rPr lang="en-US" dirty="0" smtClean="0">
+                <a:latin typeface="Arial" panose="020B0604020202020204" pitchFamily="34" charset="0"/>
+                <a:cs typeface="Arial" panose="020B0604020202020204" pitchFamily="34" charset="0"/>
+              </a:rPr>
+              <a:t>) and extract the head in another variable (string </a:t>
+            </a:r>
+            <a:r>
+              <a:rPr lang="en-US" dirty="0" err="1" smtClean="0">
+                <a:latin typeface="Arial" panose="020B0604020202020204" pitchFamily="34" charset="0"/>
+                <a:cs typeface="Arial" panose="020B0604020202020204" pitchFamily="34" charset="0"/>
+              </a:rPr>
+              <a:t>modelerName</a:t>
+            </a:r>
+            <a:r>
+              <a:rPr lang="en-US" dirty="0" smtClean="0">
+                <a:latin typeface="Arial" panose="020B0604020202020204" pitchFamily="34" charset="0"/>
+                <a:cs typeface="Arial" panose="020B0604020202020204" pitchFamily="34" charset="0"/>
+              </a:rPr>
+              <a:t>)</a:t>
+            </a:r>
+          </a:p>
+          <a:p>
+            <a:pPr marL="457200" indent="-457200">
+              <a:buFont typeface="+mj-lt"/>
+              <a:buAutoNum type="arabicPeriod"/>
+            </a:pPr>
+            <a:r>
+              <a:rPr lang="en-US" dirty="0" smtClean="0">
+                <a:latin typeface="Arial" panose="020B0604020202020204" pitchFamily="34" charset="0"/>
+                <a:cs typeface="Arial" panose="020B0604020202020204" pitchFamily="34" charset="0"/>
+              </a:rPr>
+              <a:t>Erase the first element of the list</a:t>
+            </a:r>
+          </a:p>
+          <a:p>
+            <a:pPr marL="457200" indent="-457200">
+              <a:buFont typeface="+mj-lt"/>
+              <a:buAutoNum type="arabicPeriod"/>
+            </a:pPr>
+            <a:r>
+              <a:rPr lang="en-US" dirty="0">
+                <a:latin typeface="Arial" panose="020B0604020202020204" pitchFamily="34" charset="0"/>
+                <a:cs typeface="Arial" panose="020B0604020202020204" pitchFamily="34" charset="0"/>
+              </a:rPr>
+              <a:t>Search in the map if the head </a:t>
+            </a:r>
+            <a:r>
+              <a:rPr lang="en-US" dirty="0" smtClean="0">
+                <a:latin typeface="Arial" panose="020B0604020202020204" pitchFamily="34" charset="0"/>
+                <a:cs typeface="Arial" panose="020B0604020202020204" pitchFamily="34" charset="0"/>
+              </a:rPr>
+              <a:t>exist with respect to </a:t>
+            </a:r>
+            <a:r>
+              <a:rPr lang="en-US" dirty="0" err="1">
+                <a:latin typeface="Arial" panose="020B0604020202020204" pitchFamily="34" charset="0"/>
+                <a:cs typeface="Arial" panose="020B0604020202020204" pitchFamily="34" charset="0"/>
+              </a:rPr>
+              <a:t>modelerName</a:t>
+            </a:r>
+            <a:endParaRPr lang="en-US" dirty="0" smtClean="0">
+              <a:latin typeface="Arial" panose="020B0604020202020204" pitchFamily="34" charset="0"/>
+              <a:cs typeface="Arial" panose="020B0604020202020204" pitchFamily="34" charset="0"/>
+            </a:endParaRPr>
+          </a:p>
+          <a:p>
+            <a:pPr marL="914400" lvl="1" indent="-457200">
+              <a:buFont typeface="+mj-lt"/>
+              <a:buAutoNum type="alphaLcPeriod"/>
+            </a:pPr>
+            <a:r>
+              <a:rPr lang="en-US" dirty="0" smtClean="0">
+                <a:latin typeface="Arial" panose="020B0604020202020204" pitchFamily="34" charset="0"/>
+                <a:cs typeface="Arial" panose="020B0604020202020204" pitchFamily="34" charset="0"/>
+              </a:rPr>
+              <a:t>Extract the rules and parse until have each operator rule (vector&lt;string&gt; keys)</a:t>
+            </a:r>
+          </a:p>
+          <a:p>
+            <a:pPr marL="914400" lvl="1" indent="-457200">
+              <a:buFont typeface="+mj-lt"/>
+              <a:buAutoNum type="alphaLcPeriod"/>
+            </a:pPr>
+            <a:r>
+              <a:rPr lang="en-US" dirty="0" smtClean="0">
+                <a:latin typeface="Arial" panose="020B0604020202020204" pitchFamily="34" charset="0"/>
+                <a:cs typeface="Arial" panose="020B0604020202020204" pitchFamily="34" charset="0"/>
+              </a:rPr>
+              <a:t>Compare if the keys start with (T,S,S3d,Subdiv,Comp,I,…)</a:t>
+            </a:r>
+          </a:p>
+          <a:p>
+            <a:pPr marL="914400" lvl="1" indent="-457200">
+              <a:buFont typeface="+mj-lt"/>
+              <a:buAutoNum type="alphaLcPeriod"/>
+            </a:pPr>
+            <a:r>
+              <a:rPr lang="en-US" dirty="0" smtClean="0">
+                <a:latin typeface="Arial" panose="020B0604020202020204" pitchFamily="34" charset="0"/>
+                <a:cs typeface="Arial" panose="020B0604020202020204" pitchFamily="34" charset="0"/>
+              </a:rPr>
+              <a:t>Transform the rules in model. If it contain children </a:t>
+            </a:r>
+            <a:r>
+              <a:rPr lang="en-US" dirty="0" err="1" smtClean="0">
+                <a:latin typeface="Arial" panose="020B0604020202020204" pitchFamily="34" charset="0"/>
+                <a:cs typeface="Arial" panose="020B0604020202020204" pitchFamily="34" charset="0"/>
+              </a:rPr>
+              <a:t>e.g</a:t>
+            </a:r>
+            <a:r>
+              <a:rPr lang="en-US" dirty="0" smtClean="0">
+                <a:latin typeface="Arial" panose="020B0604020202020204" pitchFamily="34" charset="0"/>
+                <a:cs typeface="Arial" panose="020B0604020202020204" pitchFamily="34" charset="0"/>
+              </a:rPr>
+              <a:t> </a:t>
+            </a:r>
+            <a:r>
+              <a:rPr lang="en-US" dirty="0" err="1" smtClean="0">
+                <a:latin typeface="Arial" panose="020B0604020202020204" pitchFamily="34" charset="0"/>
+                <a:cs typeface="Arial" panose="020B0604020202020204" pitchFamily="34" charset="0"/>
+              </a:rPr>
+              <a:t>Subdiv</a:t>
+            </a:r>
+            <a:r>
+              <a:rPr lang="en-US" dirty="0" smtClean="0">
+                <a:latin typeface="Arial" panose="020B0604020202020204" pitchFamily="34" charset="0"/>
+                <a:cs typeface="Arial" panose="020B0604020202020204" pitchFamily="34" charset="0"/>
+              </a:rPr>
+              <a:t> then save it in the model but also adding it to the vector&lt;modeler*&gt; list</a:t>
+            </a:r>
+          </a:p>
+          <a:p>
+            <a:pPr marL="457200" indent="-457200">
+              <a:buFont typeface="+mj-lt"/>
+              <a:buAutoNum type="arabicPeriod"/>
+            </a:pPr>
+            <a:r>
+              <a:rPr lang="en-US" dirty="0" smtClean="0">
+                <a:latin typeface="Arial" panose="020B0604020202020204" pitchFamily="34" charset="0"/>
+                <a:cs typeface="Arial" panose="020B0604020202020204" pitchFamily="34" charset="0"/>
+              </a:rPr>
+              <a:t>Do the process until there is no more models in the list</a:t>
+            </a:r>
+          </a:p>
+          <a:p>
+            <a:pPr marL="457200" indent="-457200">
+              <a:buFont typeface="+mj-lt"/>
+              <a:buAutoNum type="arabicPeriod"/>
+            </a:pPr>
+            <a:r>
+              <a:rPr lang="en-US" dirty="0" smtClean="0">
+                <a:latin typeface="Arial" panose="020B0604020202020204" pitchFamily="34" charset="0"/>
+                <a:cs typeface="Arial" panose="020B0604020202020204" pitchFamily="34" charset="0"/>
+              </a:rPr>
+              <a:t>Return the tree</a:t>
+            </a:r>
+          </a:p>
+          <a:p>
+            <a:pPr marL="457200" indent="-457200">
+              <a:buFont typeface="+mj-lt"/>
+              <a:buAutoNum type="arabicPeriod"/>
+            </a:pPr>
+            <a:endParaRPr lang="en-US" dirty="0">
+              <a:latin typeface="Arial" panose="020B0604020202020204" pitchFamily="34" charset="0"/>
+              <a:cs typeface="Arial" panose="020B0604020202020204" pitchFamily="34" charset="0"/>
+            </a:endParaRPr>
+          </a:p>
+        </p:txBody>
+      </p:sp>
+    </p:spTree>
+    <p:extLst>
+      <p:ext uri="{BB962C8B-B14F-4D97-AF65-F5344CB8AC3E}">
+        <p14:creationId xmlns:p14="http://schemas.microsoft.com/office/powerpoint/2010/main" val="397944075"/>
+      </p:ext>
+    </p:extLst>
+  </p:cSld>
+  <p:clrMapOvr>
+    <a:masterClrMapping/>
+  </p:clrMapOvr>
+  <p:timing>
+    <p:tnLst>
+      <p:par>
+        <p:cTn id="1" dur="indefinite" restart="never" nodeType="tmRoot"/>
+      </p:par>
+    </p:tnLst>
+  </p:timing>
+</p:sld>
+</file>
+
+<file path=ppt/slides/slide9.xml><?xml version="1.0" encoding="utf-8"?>
+<p:sld xmlns:a="http://schemas.openxmlformats.org/drawingml/2006/main" xmlns:r="http://schemas.openxmlformats.org/officeDocument/2006/relationships" xmlns:p="http://schemas.openxmlformats.org/presentationml/2006/main">
+  <p:cSld>
+    <p:spTree>
+      <p:nvGrpSpPr>
+        <p:cNvPr id="1" name=""/>
+        <p:cNvGrpSpPr/>
+        <p:nvPr/>
+      </p:nvGrpSpPr>
+      <p:grpSpPr>
+        <a:xfrm>
+          <a:off x="0" y="0"/>
+          <a:ext cx="0" cy="0"/>
+          <a:chOff x="0" y="0"/>
+          <a:chExt cx="0" cy="0"/>
+        </a:xfrm>
+      </p:grpSpPr>
+      <p:sp>
+        <p:nvSpPr>
+          <p:cNvPr id="2" name="Title 1"/>
+          <p:cNvSpPr>
+            <a:spLocks noGrp="1"/>
+          </p:cNvSpPr>
+          <p:nvPr>
+            <p:ph type="title"/>
+          </p:nvPr>
+        </p:nvSpPr>
+        <p:spPr>
+          <a:xfrm>
+            <a:off x="1484311" y="685800"/>
+            <a:ext cx="10018713" cy="743755"/>
+          </a:xfrm>
+        </p:spPr>
+        <p:txBody>
+          <a:bodyPr/>
+          <a:lstStyle/>
+          <a:p>
+            <a:r>
+              <a:rPr lang="en-US" b="1" dirty="0" smtClean="0"/>
+              <a:t>Tree Structure</a:t>
+            </a:r>
+            <a:endParaRPr lang="en-US" b="1" dirty="0"/>
+          </a:p>
+        </p:txBody>
+      </p:sp>
+      <p:pic>
+        <p:nvPicPr>
+          <p:cNvPr id="4" name="Content Placeholder 3"/>
+          <p:cNvPicPr>
+            <a:picLocks noGrp="1" noChangeAspect="1"/>
+          </p:cNvPicPr>
+          <p:nvPr>
+            <p:ph idx="1"/>
+          </p:nvPr>
+        </p:nvPicPr>
+        <p:blipFill>
+          <a:blip r:embed="rId2" cstate="print">
+            <a:extLst>
+              <a:ext uri="{28A0092B-C50C-407E-A947-70E740481C1C}">
+                <a14:useLocalDpi xmlns:a14="http://schemas.microsoft.com/office/drawing/2010/main" val="0"/>
+              </a:ext>
+            </a:extLst>
+          </a:blip>
+          <a:stretch>
+            <a:fillRect/>
+          </a:stretch>
+        </p:blipFill>
+        <p:spPr>
+          <a:xfrm>
+            <a:off x="3520784" y="1429555"/>
+            <a:ext cx="5739126" cy="5201269"/>
+          </a:xfrm>
+        </p:spPr>
+      </p:pic>
+      <p:sp>
+        <p:nvSpPr>
+          <p:cNvPr id="5" name="TextBox 4"/>
+          <p:cNvSpPr txBox="1"/>
+          <p:nvPr/>
+        </p:nvSpPr>
+        <p:spPr>
+          <a:xfrm>
+            <a:off x="10565423" y="6240651"/>
+            <a:ext cx="1875201" cy="523220"/>
+          </a:xfrm>
+          <a:prstGeom prst="rect">
+            <a:avLst/>
+          </a:prstGeom>
+          <a:noFill/>
+        </p:spPr>
+        <p:txBody>
+          <a:bodyPr wrap="square" rtlCol="0">
+            <a:spAutoFit/>
+          </a:bodyPr>
+          <a:lstStyle/>
+          <a:p>
+            <a:r>
+              <a:rPr lang="en-US" sz="1400" dirty="0" smtClean="0">
+                <a:latin typeface="Arial" panose="020B0604020202020204" pitchFamily="34" charset="0"/>
+                <a:cs typeface="Arial" panose="020B0604020202020204" pitchFamily="34" charset="0"/>
+              </a:rPr>
+              <a:t>Type 1</a:t>
+            </a:r>
+            <a:r>
+              <a:rPr lang="en-US" sz="1400" dirty="0">
+                <a:latin typeface="Arial" panose="020B0604020202020204" pitchFamily="34" charset="0"/>
+                <a:cs typeface="Arial" panose="020B0604020202020204" pitchFamily="34" charset="0"/>
+              </a:rPr>
+              <a:t> </a:t>
+            </a:r>
+            <a:r>
+              <a:rPr lang="en-US" sz="1400" dirty="0" smtClean="0">
+                <a:latin typeface="Arial" panose="020B0604020202020204" pitchFamily="34" charset="0"/>
+                <a:cs typeface="Arial" panose="020B0604020202020204" pitchFamily="34" charset="0"/>
+              </a:rPr>
+              <a:t>= SCOPE</a:t>
+            </a:r>
+          </a:p>
+          <a:p>
+            <a:r>
+              <a:rPr lang="en-US" sz="1400" dirty="0" smtClean="0">
+                <a:latin typeface="Arial" panose="020B0604020202020204" pitchFamily="34" charset="0"/>
+                <a:cs typeface="Arial" panose="020B0604020202020204" pitchFamily="34" charset="0"/>
+              </a:rPr>
+              <a:t>Type 2 = PLAIN</a:t>
+            </a:r>
+            <a:endParaRPr lang="en-US" sz="1400" dirty="0">
+              <a:latin typeface="Arial" panose="020B0604020202020204" pitchFamily="34" charset="0"/>
+              <a:cs typeface="Arial" panose="020B0604020202020204" pitchFamily="34" charset="0"/>
+            </a:endParaRPr>
+          </a:p>
+        </p:txBody>
+      </p:sp>
+    </p:spTree>
+    <p:extLst>
+      <p:ext uri="{BB962C8B-B14F-4D97-AF65-F5344CB8AC3E}">
+        <p14:creationId xmlns:p14="http://schemas.microsoft.com/office/powerpoint/2010/main" val="3396330429"/>
+      </p:ext>
+    </p:extLst>
+  </p:cSld>
+  <p:clrMapOvr>
+    <a:masterClrMapping/>
+  </p:clrMapOvr>
+  <p:timing>
+    <p:tnLst>
+      <p:par>
+        <p:cTn id="1" dur="indefinite" restart="never" nodeType="tmRoot"/>
+      </p:par>
+    </p:tnLst>
+  </p:timing>
 </p:sld>
 </file>
 

</xml_diff>